<commit_message>
Update Pi Project Presentation.pptx
</commit_message>
<xml_diff>
--- a/Pi Project Presentation.pptx
+++ b/Pi Project Presentation.pptx
@@ -2,10 +2,13 @@
 <file path=ppt/presentation.xml><?xml version="1.0" encoding="utf-8"?>
 <p:presentation xmlns:a="http://schemas.openxmlformats.org/drawingml/2006/main" xmlns:r="http://schemas.openxmlformats.org/officeDocument/2006/relationships" xmlns:p="http://schemas.openxmlformats.org/presentationml/2006/main" saveSubsetFonts="1">
   <p:sldMasterIdLst>
-    <p:sldMasterId id="2147483648" r:id="rId1"/>
+    <p:sldMasterId id="2147483660" r:id="rId1"/>
   </p:sldMasterIdLst>
   <p:sldIdLst>
     <p:sldId id="256" r:id="rId2"/>
+    <p:sldId id="257" r:id="rId3"/>
+    <p:sldId id="258" r:id="rId4"/>
+    <p:sldId id="259" r:id="rId5"/>
   </p:sldIdLst>
   <p:sldSz cx="12192000" cy="6858000"/>
   <p:notesSz cx="6858000" cy="9144000"/>
@@ -104,12 +107,31 @@
       </a:defRPr>
     </a:lvl9pPr>
   </p:defaultTextStyle>
+  <p:extLst>
+    <p:ext uri="{EFAFB233-063F-42B5-8137-9DF3F51BA10A}">
+      <p15:sldGuideLst xmlns:p15="http://schemas.microsoft.com/office/powerpoint/2012/main"/>
+    </p:ext>
+  </p:extLst>
 </p:presentation>
 </file>
 
 <file path=ppt/slideLayouts/slideLayout1.xml><?xml version="1.0" encoding="utf-8"?>
 <p:sldLayout xmlns:a="http://schemas.openxmlformats.org/drawingml/2006/main" xmlns:r="http://schemas.openxmlformats.org/officeDocument/2006/relationships" xmlns:p="http://schemas.openxmlformats.org/presentationml/2006/main" type="title" preserve="1">
   <p:cSld name="Title Slide">
+    <p:bg>
+      <p:bgPr>
+        <a:blipFill dpi="0" rotWithShape="1">
+          <a:blip r:embed="rId2">
+            <a:lum/>
+          </a:blip>
+          <a:srcRect/>
+          <a:stretch>
+            <a:fillRect/>
+          </a:stretch>
+        </a:blipFill>
+        <a:effectLst/>
+      </p:bgPr>
+    </p:bg>
     <p:spTree>
       <p:nvGrpSpPr>
         <p:cNvPr id="1" name=""/>
@@ -126,101 +148,164 @@
       </p:grpSpPr>
       <p:sp>
         <p:nvSpPr>
-          <p:cNvPr id="2" name="Title 1">
-            <a:extLst>
-              <a:ext uri="{FF2B5EF4-FFF2-40B4-BE49-F238E27FC236}">
-                <a16:creationId xmlns:a16="http://schemas.microsoft.com/office/drawing/2014/main" id="{36A892E3-6927-4346-B8A5-47ECBC26AE26}"/>
-              </a:ext>
-            </a:extLst>
-          </p:cNvPr>
-          <p:cNvSpPr>
-            <a:spLocks noGrp="1"/>
-          </p:cNvSpPr>
-          <p:nvPr>
-            <p:ph type="ctrTitle"/>
+          <p:cNvPr id="2" name="Title 1"/>
+          <p:cNvSpPr>
+            <a:spLocks noGrp="1"/>
+          </p:cNvSpPr>
+          <p:nvPr>
+            <p:ph type="ctrTitle" hasCustomPrompt="1"/>
           </p:nvPr>
         </p:nvSpPr>
         <p:spPr>
           <a:xfrm>
-            <a:off x="1524000" y="1122363"/>
-            <a:ext cx="9144000" cy="2387600"/>
+            <a:off x="924233" y="1494502"/>
+            <a:ext cx="10677835" cy="2281085"/>
+          </a:xfrm>
+          <a:noFill/>
+          <a:effectLst>
+            <a:outerShdw blurRad="50800" dist="38100" dir="2700000" algn="tl" rotWithShape="0">
+              <a:prstClr val="black">
+                <a:alpha val="40000"/>
+              </a:prstClr>
+            </a:outerShdw>
+          </a:effectLst>
+        </p:spPr>
+        <p:txBody>
+          <a:bodyPr>
+            <a:normAutofit/>
+          </a:bodyPr>
+          <a:lstStyle>
+            <a:lvl1pPr algn="r">
+              <a:defRPr sz="4800">
+                <a:solidFill>
+                  <a:srgbClr val="002060"/>
+                </a:solidFill>
+              </a:defRPr>
+            </a:lvl1pPr>
+          </a:lstStyle>
+          <a:p>
+            <a:r>
+              <a:rPr lang="en-US" dirty="0"/>
+              <a:t>Click to edit </a:t>
+            </a:r>
+            <a:br>
+              <a:rPr lang="en-US" dirty="0"/>
+            </a:br>
+            <a:r>
+              <a:rPr lang="en-US" dirty="0"/>
+              <a:t>Master title style</a:t>
+            </a:r>
+          </a:p>
+        </p:txBody>
+      </p:sp>
+      <p:sp>
+        <p:nvSpPr>
+          <p:cNvPr id="3" name="Subtitle 2"/>
+          <p:cNvSpPr>
+            <a:spLocks noGrp="1"/>
+          </p:cNvSpPr>
+          <p:nvPr>
+            <p:ph type="subTitle" idx="1"/>
+          </p:nvPr>
+        </p:nvSpPr>
+        <p:spPr>
+          <a:xfrm>
+            <a:off x="904568" y="4945624"/>
+            <a:ext cx="10668000" cy="904568"/>
           </a:xfrm>
         </p:spPr>
         <p:txBody>
-          <a:bodyPr anchor="b"/>
+          <a:bodyPr>
+            <a:normAutofit/>
+          </a:bodyPr>
           <a:lstStyle>
-            <a:lvl1pPr algn="ctr">
-              <a:defRPr sz="6000"/>
+            <a:lvl1pPr marL="0" indent="0" algn="r">
+              <a:buNone/>
+              <a:defRPr sz="3733" b="0" i="0">
+                <a:solidFill>
+                  <a:schemeClr val="bg1"/>
+                </a:solidFill>
+              </a:defRPr>
             </a:lvl1pPr>
-          </a:lstStyle>
-          <a:p>
-            <a:r>
-              <a:rPr lang="en-US"/>
-              <a:t>Click to edit Master title style</a:t>
-            </a:r>
-          </a:p>
-        </p:txBody>
-      </p:sp>
-      <p:sp>
-        <p:nvSpPr>
-          <p:cNvPr id="3" name="Subtitle 2">
-            <a:extLst>
-              <a:ext uri="{FF2B5EF4-FFF2-40B4-BE49-F238E27FC236}">
-                <a16:creationId xmlns:a16="http://schemas.microsoft.com/office/drawing/2014/main" id="{FC69631F-FFCF-47DC-8E2F-EF6DB72A6D52}"/>
-              </a:ext>
-            </a:extLst>
-          </p:cNvPr>
-          <p:cNvSpPr>
-            <a:spLocks noGrp="1"/>
-          </p:cNvSpPr>
-          <p:nvPr>
-            <p:ph type="subTitle" idx="1"/>
-          </p:nvPr>
-        </p:nvSpPr>
-        <p:spPr>
-          <a:xfrm>
-            <a:off x="1524000" y="3602038"/>
-            <a:ext cx="9144000" cy="1655762"/>
-          </a:xfrm>
-        </p:spPr>
-        <p:txBody>
-          <a:bodyPr/>
-          <a:lstStyle>
-            <a:lvl1pPr marL="0" indent="0" algn="ctr">
-              <a:buNone/>
-              <a:defRPr sz="2400"/>
-            </a:lvl1pPr>
-            <a:lvl2pPr marL="457200" indent="0" algn="ctr">
-              <a:buNone/>
-              <a:defRPr sz="2000"/>
+            <a:lvl2pPr marL="609585" indent="0" algn="ctr">
+              <a:buNone/>
+              <a:defRPr>
+                <a:solidFill>
+                  <a:schemeClr val="tx1">
+                    <a:tint val="75000"/>
+                  </a:schemeClr>
+                </a:solidFill>
+              </a:defRPr>
             </a:lvl2pPr>
-            <a:lvl3pPr marL="914400" indent="0" algn="ctr">
-              <a:buNone/>
-              <a:defRPr sz="1800"/>
+            <a:lvl3pPr marL="1219170" indent="0" algn="ctr">
+              <a:buNone/>
+              <a:defRPr>
+                <a:solidFill>
+                  <a:schemeClr val="tx1">
+                    <a:tint val="75000"/>
+                  </a:schemeClr>
+                </a:solidFill>
+              </a:defRPr>
             </a:lvl3pPr>
-            <a:lvl4pPr marL="1371600" indent="0" algn="ctr">
-              <a:buNone/>
-              <a:defRPr sz="1600"/>
+            <a:lvl4pPr marL="1828754" indent="0" algn="ctr">
+              <a:buNone/>
+              <a:defRPr>
+                <a:solidFill>
+                  <a:schemeClr val="tx1">
+                    <a:tint val="75000"/>
+                  </a:schemeClr>
+                </a:solidFill>
+              </a:defRPr>
             </a:lvl4pPr>
-            <a:lvl5pPr marL="1828800" indent="0" algn="ctr">
-              <a:buNone/>
-              <a:defRPr sz="1600"/>
+            <a:lvl5pPr marL="2438339" indent="0" algn="ctr">
+              <a:buNone/>
+              <a:defRPr>
+                <a:solidFill>
+                  <a:schemeClr val="tx1">
+                    <a:tint val="75000"/>
+                  </a:schemeClr>
+                </a:solidFill>
+              </a:defRPr>
             </a:lvl5pPr>
-            <a:lvl6pPr marL="2286000" indent="0" algn="ctr">
-              <a:buNone/>
-              <a:defRPr sz="1600"/>
+            <a:lvl6pPr marL="3047924" indent="0" algn="ctr">
+              <a:buNone/>
+              <a:defRPr>
+                <a:solidFill>
+                  <a:schemeClr val="tx1">
+                    <a:tint val="75000"/>
+                  </a:schemeClr>
+                </a:solidFill>
+              </a:defRPr>
             </a:lvl6pPr>
-            <a:lvl7pPr marL="2743200" indent="0" algn="ctr">
-              <a:buNone/>
-              <a:defRPr sz="1600"/>
+            <a:lvl7pPr marL="3657509" indent="0" algn="ctr">
+              <a:buNone/>
+              <a:defRPr>
+                <a:solidFill>
+                  <a:schemeClr val="tx1">
+                    <a:tint val="75000"/>
+                  </a:schemeClr>
+                </a:solidFill>
+              </a:defRPr>
             </a:lvl7pPr>
-            <a:lvl8pPr marL="3200400" indent="0" algn="ctr">
-              <a:buNone/>
-              <a:defRPr sz="1600"/>
+            <a:lvl8pPr marL="4267093" indent="0" algn="ctr">
+              <a:buNone/>
+              <a:defRPr>
+                <a:solidFill>
+                  <a:schemeClr val="tx1">
+                    <a:tint val="75000"/>
+                  </a:schemeClr>
+                </a:solidFill>
+              </a:defRPr>
             </a:lvl8pPr>
-            <a:lvl9pPr marL="3657600" indent="0" algn="ctr">
-              <a:buNone/>
-              <a:defRPr sz="1600"/>
+            <a:lvl9pPr marL="4876678" indent="0" algn="ctr">
+              <a:buNone/>
+              <a:defRPr>
+                <a:solidFill>
+                  <a:schemeClr val="tx1">
+                    <a:tint val="75000"/>
+                  </a:schemeClr>
+                </a:solidFill>
+              </a:defRPr>
             </a:lvl9pPr>
           </a:lstStyle>
           <a:p>
@@ -228,18 +313,13 @@
               <a:rPr lang="en-US"/>
               <a:t>Click to edit Master subtitle style</a:t>
             </a:r>
-          </a:p>
-        </p:txBody>
-      </p:sp>
-      <p:sp>
-        <p:nvSpPr>
-          <p:cNvPr id="4" name="Date Placeholder 3">
-            <a:extLst>
-              <a:ext uri="{FF2B5EF4-FFF2-40B4-BE49-F238E27FC236}">
-                <a16:creationId xmlns:a16="http://schemas.microsoft.com/office/drawing/2014/main" id="{BE6AAC95-FADB-459C-A6F7-42E5BA8D5BF3}"/>
-              </a:ext>
-            </a:extLst>
-          </p:cNvPr>
+            <a:endParaRPr lang="en-US" dirty="0"/>
+          </a:p>
+        </p:txBody>
+      </p:sp>
+      <p:sp>
+        <p:nvSpPr>
+          <p:cNvPr id="4" name="Date Placeholder 3"/>
           <p:cNvSpPr>
             <a:spLocks noGrp="1"/>
           </p:cNvSpPr>
@@ -262,13 +342,7 @@
       </p:sp>
       <p:sp>
         <p:nvSpPr>
-          <p:cNvPr id="5" name="Footer Placeholder 4">
-            <a:extLst>
-              <a:ext uri="{FF2B5EF4-FFF2-40B4-BE49-F238E27FC236}">
-                <a16:creationId xmlns:a16="http://schemas.microsoft.com/office/drawing/2014/main" id="{B71D57BF-8D4D-4963-976A-A61C663DC474}"/>
-              </a:ext>
-            </a:extLst>
-          </p:cNvPr>
+          <p:cNvPr id="5" name="Footer Placeholder 4"/>
           <p:cNvSpPr>
             <a:spLocks noGrp="1"/>
           </p:cNvSpPr>
@@ -287,13 +361,7 @@
       </p:sp>
       <p:sp>
         <p:nvSpPr>
-          <p:cNvPr id="6" name="Slide Number Placeholder 5">
-            <a:extLst>
-              <a:ext uri="{FF2B5EF4-FFF2-40B4-BE49-F238E27FC236}">
-                <a16:creationId xmlns:a16="http://schemas.microsoft.com/office/drawing/2014/main" id="{09CD9972-1FD1-40A5-996D-C0303FE03F0B}"/>
-              </a:ext>
-            </a:extLst>
-          </p:cNvPr>
+          <p:cNvPr id="6" name="Slide Number Placeholder 5"/>
           <p:cNvSpPr>
             <a:spLocks noGrp="1"/>
           </p:cNvSpPr>
@@ -317,7 +385,7 @@
     </p:spTree>
     <p:extLst>
       <p:ext uri="{BB962C8B-B14F-4D97-AF65-F5344CB8AC3E}">
-        <p14:creationId xmlns:p14="http://schemas.microsoft.com/office/powerpoint/2010/main" val="3711731596"/>
+        <p14:creationId xmlns:p14="http://schemas.microsoft.com/office/powerpoint/2010/main" val="3907001757"/>
       </p:ext>
     </p:extLst>
   </p:cSld>
@@ -328,6 +396,261 @@
 </file>
 
 <file path=ppt/slideLayouts/slideLayout10.xml><?xml version="1.0" encoding="utf-8"?>
+<p:sldLayout xmlns:a="http://schemas.openxmlformats.org/drawingml/2006/main" xmlns:r="http://schemas.openxmlformats.org/officeDocument/2006/relationships" xmlns:p="http://schemas.openxmlformats.org/presentationml/2006/main" type="picTx" preserve="1">
+  <p:cSld name="Picture with Caption">
+    <p:spTree>
+      <p:nvGrpSpPr>
+        <p:cNvPr id="1" name=""/>
+        <p:cNvGrpSpPr/>
+        <p:nvPr/>
+      </p:nvGrpSpPr>
+      <p:grpSpPr>
+        <a:xfrm>
+          <a:off x="0" y="0"/>
+          <a:ext cx="0" cy="0"/>
+          <a:chOff x="0" y="0"/>
+          <a:chExt cx="0" cy="0"/>
+        </a:xfrm>
+      </p:grpSpPr>
+      <p:sp>
+        <p:nvSpPr>
+          <p:cNvPr id="2" name="Title 1"/>
+          <p:cNvSpPr>
+            <a:spLocks noGrp="1"/>
+          </p:cNvSpPr>
+          <p:nvPr>
+            <p:ph type="title"/>
+          </p:nvPr>
+        </p:nvSpPr>
+        <p:spPr>
+          <a:xfrm>
+            <a:off x="2389717" y="4800600"/>
+            <a:ext cx="7315200" cy="566739"/>
+          </a:xfrm>
+        </p:spPr>
+        <p:txBody>
+          <a:bodyPr anchor="b"/>
+          <a:lstStyle>
+            <a:lvl1pPr algn="l">
+              <a:defRPr sz="2667" b="1"/>
+            </a:lvl1pPr>
+          </a:lstStyle>
+          <a:p>
+            <a:r>
+              <a:rPr lang="en-US"/>
+              <a:t>Click to edit Master title style</a:t>
+            </a:r>
+          </a:p>
+        </p:txBody>
+      </p:sp>
+      <p:sp>
+        <p:nvSpPr>
+          <p:cNvPr id="3" name="Picture Placeholder 2"/>
+          <p:cNvSpPr>
+            <a:spLocks noGrp="1"/>
+          </p:cNvSpPr>
+          <p:nvPr>
+            <p:ph type="pic" idx="1"/>
+          </p:nvPr>
+        </p:nvSpPr>
+        <p:spPr>
+          <a:xfrm>
+            <a:off x="2389717" y="612775"/>
+            <a:ext cx="7315200" cy="4114800"/>
+          </a:xfrm>
+        </p:spPr>
+        <p:txBody>
+          <a:bodyPr/>
+          <a:lstStyle>
+            <a:lvl1pPr marL="0" indent="0">
+              <a:buNone/>
+              <a:defRPr sz="4267"/>
+            </a:lvl1pPr>
+            <a:lvl2pPr marL="609585" indent="0">
+              <a:buNone/>
+              <a:defRPr sz="3733"/>
+            </a:lvl2pPr>
+            <a:lvl3pPr marL="1219170" indent="0">
+              <a:buNone/>
+              <a:defRPr sz="3200"/>
+            </a:lvl3pPr>
+            <a:lvl4pPr marL="1828754" indent="0">
+              <a:buNone/>
+              <a:defRPr sz="2667"/>
+            </a:lvl4pPr>
+            <a:lvl5pPr marL="2438339" indent="0">
+              <a:buNone/>
+              <a:defRPr sz="2667"/>
+            </a:lvl5pPr>
+            <a:lvl6pPr marL="3047924" indent="0">
+              <a:buNone/>
+              <a:defRPr sz="2667"/>
+            </a:lvl6pPr>
+            <a:lvl7pPr marL="3657509" indent="0">
+              <a:buNone/>
+              <a:defRPr sz="2667"/>
+            </a:lvl7pPr>
+            <a:lvl8pPr marL="4267093" indent="0">
+              <a:buNone/>
+              <a:defRPr sz="2667"/>
+            </a:lvl8pPr>
+            <a:lvl9pPr marL="4876678" indent="0">
+              <a:buNone/>
+              <a:defRPr sz="2667"/>
+            </a:lvl9pPr>
+          </a:lstStyle>
+          <a:p>
+            <a:r>
+              <a:rPr lang="en-US"/>
+              <a:t>Click icon to add picture</a:t>
+            </a:r>
+          </a:p>
+        </p:txBody>
+      </p:sp>
+      <p:sp>
+        <p:nvSpPr>
+          <p:cNvPr id="4" name="Text Placeholder 3"/>
+          <p:cNvSpPr>
+            <a:spLocks noGrp="1"/>
+          </p:cNvSpPr>
+          <p:nvPr>
+            <p:ph type="body" sz="half" idx="2"/>
+          </p:nvPr>
+        </p:nvSpPr>
+        <p:spPr>
+          <a:xfrm>
+            <a:off x="2389717" y="5367338"/>
+            <a:ext cx="7315200" cy="804863"/>
+          </a:xfrm>
+        </p:spPr>
+        <p:txBody>
+          <a:bodyPr/>
+          <a:lstStyle>
+            <a:lvl1pPr marL="0" indent="0">
+              <a:buNone/>
+              <a:defRPr sz="1867"/>
+            </a:lvl1pPr>
+            <a:lvl2pPr marL="609585" indent="0">
+              <a:buNone/>
+              <a:defRPr sz="1600"/>
+            </a:lvl2pPr>
+            <a:lvl3pPr marL="1219170" indent="0">
+              <a:buNone/>
+              <a:defRPr sz="1333"/>
+            </a:lvl3pPr>
+            <a:lvl4pPr marL="1828754" indent="0">
+              <a:buNone/>
+              <a:defRPr sz="1200"/>
+            </a:lvl4pPr>
+            <a:lvl5pPr marL="2438339" indent="0">
+              <a:buNone/>
+              <a:defRPr sz="1200"/>
+            </a:lvl5pPr>
+            <a:lvl6pPr marL="3047924" indent="0">
+              <a:buNone/>
+              <a:defRPr sz="1200"/>
+            </a:lvl6pPr>
+            <a:lvl7pPr marL="3657509" indent="0">
+              <a:buNone/>
+              <a:defRPr sz="1200"/>
+            </a:lvl7pPr>
+            <a:lvl8pPr marL="4267093" indent="0">
+              <a:buNone/>
+              <a:defRPr sz="1200"/>
+            </a:lvl8pPr>
+            <a:lvl9pPr marL="4876678" indent="0">
+              <a:buNone/>
+              <a:defRPr sz="1200"/>
+            </a:lvl9pPr>
+          </a:lstStyle>
+          <a:p>
+            <a:pPr lvl="0"/>
+            <a:r>
+              <a:rPr lang="en-US"/>
+              <a:t>Click to edit Master text styles</a:t>
+            </a:r>
+          </a:p>
+        </p:txBody>
+      </p:sp>
+      <p:sp>
+        <p:nvSpPr>
+          <p:cNvPr id="5" name="Date Placeholder 4"/>
+          <p:cNvSpPr>
+            <a:spLocks noGrp="1"/>
+          </p:cNvSpPr>
+          <p:nvPr>
+            <p:ph type="dt" sz="half" idx="10"/>
+          </p:nvPr>
+        </p:nvSpPr>
+        <p:spPr/>
+        <p:txBody>
+          <a:bodyPr/>
+          <a:lstStyle/>
+          <a:p>
+            <a:fld id="{275923A7-394F-45B3-B9E8-A742D4C55B21}" type="datetimeFigureOut">
+              <a:rPr lang="en-US" smtClean="0"/>
+              <a:t>11/6/2019</a:t>
+            </a:fld>
+            <a:endParaRPr lang="en-US"/>
+          </a:p>
+        </p:txBody>
+      </p:sp>
+      <p:sp>
+        <p:nvSpPr>
+          <p:cNvPr id="6" name="Footer Placeholder 5"/>
+          <p:cNvSpPr>
+            <a:spLocks noGrp="1"/>
+          </p:cNvSpPr>
+          <p:nvPr>
+            <p:ph type="ftr" sz="quarter" idx="11"/>
+          </p:nvPr>
+        </p:nvSpPr>
+        <p:spPr/>
+        <p:txBody>
+          <a:bodyPr/>
+          <a:lstStyle/>
+          <a:p>
+            <a:endParaRPr lang="en-US"/>
+          </a:p>
+        </p:txBody>
+      </p:sp>
+      <p:sp>
+        <p:nvSpPr>
+          <p:cNvPr id="7" name="Slide Number Placeholder 6"/>
+          <p:cNvSpPr>
+            <a:spLocks noGrp="1"/>
+          </p:cNvSpPr>
+          <p:nvPr>
+            <p:ph type="sldNum" sz="quarter" idx="12"/>
+          </p:nvPr>
+        </p:nvSpPr>
+        <p:spPr/>
+        <p:txBody>
+          <a:bodyPr/>
+          <a:lstStyle/>
+          <a:p>
+            <a:fld id="{24E8BC4F-5068-4953-8B8F-C824F90EC491}" type="slidenum">
+              <a:rPr lang="en-US" smtClean="0"/>
+              <a:t>‹#›</a:t>
+            </a:fld>
+            <a:endParaRPr lang="en-US"/>
+          </a:p>
+        </p:txBody>
+      </p:sp>
+    </p:spTree>
+    <p:extLst>
+      <p:ext uri="{BB962C8B-B14F-4D97-AF65-F5344CB8AC3E}">
+        <p14:creationId xmlns:p14="http://schemas.microsoft.com/office/powerpoint/2010/main" val="2991998845"/>
+      </p:ext>
+    </p:extLst>
+  </p:cSld>
+  <p:clrMapOvr>
+    <a:masterClrMapping/>
+  </p:clrMapOvr>
+</p:sldLayout>
+</file>
+
+<file path=ppt/slideLayouts/slideLayout11.xml><?xml version="1.0" encoding="utf-8"?>
 <p:sldLayout xmlns:a="http://schemas.openxmlformats.org/drawingml/2006/main" xmlns:r="http://schemas.openxmlformats.org/officeDocument/2006/relationships" xmlns:p="http://schemas.openxmlformats.org/presentationml/2006/main" type="vertTx" preserve="1">
   <p:cSld name="Title and Vertical Text">
     <p:spTree>
@@ -346,13 +669,7 @@
       </p:grpSpPr>
       <p:sp>
         <p:nvSpPr>
-          <p:cNvPr id="2" name="Title 1">
-            <a:extLst>
-              <a:ext uri="{FF2B5EF4-FFF2-40B4-BE49-F238E27FC236}">
-                <a16:creationId xmlns:a16="http://schemas.microsoft.com/office/drawing/2014/main" id="{B696F5F4-0CCE-49E6-9A7A-6DC313694775}"/>
-              </a:ext>
-            </a:extLst>
-          </p:cNvPr>
+          <p:cNvPr id="2" name="Title 1"/>
           <p:cNvSpPr>
             <a:spLocks noGrp="1"/>
           </p:cNvSpPr>
@@ -374,13 +691,7 @@
       </p:sp>
       <p:sp>
         <p:nvSpPr>
-          <p:cNvPr id="3" name="Vertical Text Placeholder 2">
-            <a:extLst>
-              <a:ext uri="{FF2B5EF4-FFF2-40B4-BE49-F238E27FC236}">
-                <a16:creationId xmlns:a16="http://schemas.microsoft.com/office/drawing/2014/main" id="{3A81A752-19F8-414E-972D-E0AC29F61BC5}"/>
-              </a:ext>
-            </a:extLst>
-          </p:cNvPr>
+          <p:cNvPr id="3" name="Vertical Text Placeholder 2"/>
           <p:cNvSpPr>
             <a:spLocks noGrp="1"/>
           </p:cNvSpPr>
@@ -431,13 +742,7 @@
       </p:sp>
       <p:sp>
         <p:nvSpPr>
-          <p:cNvPr id="4" name="Date Placeholder 3">
-            <a:extLst>
-              <a:ext uri="{FF2B5EF4-FFF2-40B4-BE49-F238E27FC236}">
-                <a16:creationId xmlns:a16="http://schemas.microsoft.com/office/drawing/2014/main" id="{32214389-39F9-4155-BD3E-74B00AAFE22E}"/>
-              </a:ext>
-            </a:extLst>
-          </p:cNvPr>
+          <p:cNvPr id="4" name="Date Placeholder 3"/>
           <p:cNvSpPr>
             <a:spLocks noGrp="1"/>
           </p:cNvSpPr>
@@ -460,13 +765,7 @@
       </p:sp>
       <p:sp>
         <p:nvSpPr>
-          <p:cNvPr id="5" name="Footer Placeholder 4">
-            <a:extLst>
-              <a:ext uri="{FF2B5EF4-FFF2-40B4-BE49-F238E27FC236}">
-                <a16:creationId xmlns:a16="http://schemas.microsoft.com/office/drawing/2014/main" id="{CE8DB379-C9C2-43E8-AAF4-D66277519F4C}"/>
-              </a:ext>
-            </a:extLst>
-          </p:cNvPr>
+          <p:cNvPr id="5" name="Footer Placeholder 4"/>
           <p:cNvSpPr>
             <a:spLocks noGrp="1"/>
           </p:cNvSpPr>
@@ -485,13 +784,7 @@
       </p:sp>
       <p:sp>
         <p:nvSpPr>
-          <p:cNvPr id="6" name="Slide Number Placeholder 5">
-            <a:extLst>
-              <a:ext uri="{FF2B5EF4-FFF2-40B4-BE49-F238E27FC236}">
-                <a16:creationId xmlns:a16="http://schemas.microsoft.com/office/drawing/2014/main" id="{B1B7C85C-FD31-462F-B2FD-9289860F01A3}"/>
-              </a:ext>
-            </a:extLst>
-          </p:cNvPr>
+          <p:cNvPr id="6" name="Slide Number Placeholder 5"/>
           <p:cNvSpPr>
             <a:spLocks noGrp="1"/>
           </p:cNvSpPr>
@@ -515,7 +808,7 @@
     </p:spTree>
     <p:extLst>
       <p:ext uri="{BB962C8B-B14F-4D97-AF65-F5344CB8AC3E}">
-        <p14:creationId xmlns:p14="http://schemas.microsoft.com/office/powerpoint/2010/main" val="1451012356"/>
+        <p14:creationId xmlns:p14="http://schemas.microsoft.com/office/powerpoint/2010/main" val="496431300"/>
       </p:ext>
     </p:extLst>
   </p:cSld>
@@ -525,7 +818,7 @@
 </p:sldLayout>
 </file>
 
-<file path=ppt/slideLayouts/slideLayout11.xml><?xml version="1.0" encoding="utf-8"?>
+<file path=ppt/slideLayouts/slideLayout12.xml><?xml version="1.0" encoding="utf-8"?>
 <p:sldLayout xmlns:a="http://schemas.openxmlformats.org/drawingml/2006/main" xmlns:r="http://schemas.openxmlformats.org/officeDocument/2006/relationships" xmlns:p="http://schemas.openxmlformats.org/presentationml/2006/main" type="vertTitleAndTx" preserve="1">
   <p:cSld name="Vertical Title and Text">
     <p:spTree>
@@ -544,13 +837,7 @@
       </p:grpSpPr>
       <p:sp>
         <p:nvSpPr>
-          <p:cNvPr id="2" name="Vertical Title 1">
-            <a:extLst>
-              <a:ext uri="{FF2B5EF4-FFF2-40B4-BE49-F238E27FC236}">
-                <a16:creationId xmlns:a16="http://schemas.microsoft.com/office/drawing/2014/main" id="{B4AE041D-E486-4CB0-ACA0-FBE32D856BBA}"/>
-              </a:ext>
-            </a:extLst>
-          </p:cNvPr>
+          <p:cNvPr id="2" name="Vertical Title 1"/>
           <p:cNvSpPr>
             <a:spLocks noGrp="1"/>
           </p:cNvSpPr>
@@ -560,8 +847,8 @@
         </p:nvSpPr>
         <p:spPr>
           <a:xfrm>
-            <a:off x="8724900" y="365125"/>
-            <a:ext cx="2628900" cy="5811838"/>
+            <a:off x="8839200" y="274639"/>
+            <a:ext cx="2743200" cy="5851525"/>
           </a:xfrm>
         </p:spPr>
         <p:txBody>
@@ -577,13 +864,7 @@
       </p:sp>
       <p:sp>
         <p:nvSpPr>
-          <p:cNvPr id="3" name="Vertical Text Placeholder 2">
-            <a:extLst>
-              <a:ext uri="{FF2B5EF4-FFF2-40B4-BE49-F238E27FC236}">
-                <a16:creationId xmlns:a16="http://schemas.microsoft.com/office/drawing/2014/main" id="{2FC636DC-4FAF-4627-8DCA-DF634F7089B5}"/>
-              </a:ext>
-            </a:extLst>
-          </p:cNvPr>
+          <p:cNvPr id="3" name="Vertical Text Placeholder 2"/>
           <p:cNvSpPr>
             <a:spLocks noGrp="1"/>
           </p:cNvSpPr>
@@ -593,8 +874,8 @@
         </p:nvSpPr>
         <p:spPr>
           <a:xfrm>
-            <a:off x="838200" y="365125"/>
-            <a:ext cx="7734300" cy="5811838"/>
+            <a:off x="609600" y="274639"/>
+            <a:ext cx="8026400" cy="5851525"/>
           </a:xfrm>
         </p:spPr>
         <p:txBody>
@@ -639,13 +920,7 @@
       </p:sp>
       <p:sp>
         <p:nvSpPr>
-          <p:cNvPr id="4" name="Date Placeholder 3">
-            <a:extLst>
-              <a:ext uri="{FF2B5EF4-FFF2-40B4-BE49-F238E27FC236}">
-                <a16:creationId xmlns:a16="http://schemas.microsoft.com/office/drawing/2014/main" id="{948F5302-A71A-4C8D-AD34-C0AC2D5CC66B}"/>
-              </a:ext>
-            </a:extLst>
-          </p:cNvPr>
+          <p:cNvPr id="4" name="Date Placeholder 3"/>
           <p:cNvSpPr>
             <a:spLocks noGrp="1"/>
           </p:cNvSpPr>
@@ -668,13 +943,7 @@
       </p:sp>
       <p:sp>
         <p:nvSpPr>
-          <p:cNvPr id="5" name="Footer Placeholder 4">
-            <a:extLst>
-              <a:ext uri="{FF2B5EF4-FFF2-40B4-BE49-F238E27FC236}">
-                <a16:creationId xmlns:a16="http://schemas.microsoft.com/office/drawing/2014/main" id="{D4740DAE-CB3D-41A7-A45C-463CABAC9FF9}"/>
-              </a:ext>
-            </a:extLst>
-          </p:cNvPr>
+          <p:cNvPr id="5" name="Footer Placeholder 4"/>
           <p:cNvSpPr>
             <a:spLocks noGrp="1"/>
           </p:cNvSpPr>
@@ -693,13 +962,7 @@
       </p:sp>
       <p:sp>
         <p:nvSpPr>
-          <p:cNvPr id="6" name="Slide Number Placeholder 5">
-            <a:extLst>
-              <a:ext uri="{FF2B5EF4-FFF2-40B4-BE49-F238E27FC236}">
-                <a16:creationId xmlns:a16="http://schemas.microsoft.com/office/drawing/2014/main" id="{64380B8A-E4D5-4C70-A06E-350728C86247}"/>
-              </a:ext>
-            </a:extLst>
-          </p:cNvPr>
+          <p:cNvPr id="6" name="Slide Number Placeholder 5"/>
           <p:cNvSpPr>
             <a:spLocks noGrp="1"/>
           </p:cNvSpPr>
@@ -720,10 +983,59 @@
           </a:p>
         </p:txBody>
       </p:sp>
+      <p:pic>
+        <p:nvPicPr>
+          <p:cNvPr id="7" name="Picture 6" descr="E:\websites\free-power-point-templates\2012\logos.png">
+            <a:extLst>
+              <a:ext uri="{FF2B5EF4-FFF2-40B4-BE49-F238E27FC236}">
+                <a16:creationId xmlns:a16="http://schemas.microsoft.com/office/drawing/2014/main" id="{08B89D22-1D6E-450B-881F-4D2A4C527F72}"/>
+              </a:ext>
+            </a:extLst>
+          </p:cNvPr>
+          <p:cNvPicPr>
+            <a:picLocks noChangeAspect="1" noChangeArrowheads="1"/>
+          </p:cNvPicPr>
+          <p:nvPr/>
+        </p:nvPicPr>
+        <p:blipFill>
+          <a:blip r:embed="rId2">
+            <a:extLst>
+              <a:ext uri="{28A0092B-C50C-407E-A947-70E740481C1C}">
+                <a14:useLocalDpi xmlns:a14="http://schemas.microsoft.com/office/drawing/2010/main" val="0"/>
+              </a:ext>
+            </a:extLst>
+          </a:blip>
+          <a:stretch>
+            <a:fillRect/>
+          </a:stretch>
+        </p:blipFill>
+        <p:spPr bwMode="auto">
+          <a:xfrm>
+            <a:off x="5077967" y="3101618"/>
+            <a:ext cx="1951712" cy="702615"/>
+          </a:xfrm>
+          <a:prstGeom prst="rect">
+            <a:avLst/>
+          </a:prstGeom>
+          <a:noFill/>
+          <a:ln>
+            <a:noFill/>
+          </a:ln>
+          <a:extLst>
+            <a:ext uri="{909E8E84-426E-40DD-AFC4-6F175D3DCCD1}">
+              <a14:hiddenFill xmlns:a14="http://schemas.microsoft.com/office/drawing/2010/main">
+                <a:solidFill>
+                  <a:srgbClr val="FFFFFF"/>
+                </a:solidFill>
+              </a14:hiddenFill>
+            </a:ext>
+          </a:extLst>
+        </p:spPr>
+      </p:pic>
     </p:spTree>
     <p:extLst>
       <p:ext uri="{BB962C8B-B14F-4D97-AF65-F5344CB8AC3E}">
-        <p14:creationId xmlns:p14="http://schemas.microsoft.com/office/powerpoint/2010/main" val="37864512"/>
+        <p14:creationId xmlns:p14="http://schemas.microsoft.com/office/powerpoint/2010/main" val="1004963086"/>
       </p:ext>
     </p:extLst>
   </p:cSld>
@@ -752,13 +1064,7 @@
       </p:grpSpPr>
       <p:sp>
         <p:nvSpPr>
-          <p:cNvPr id="2" name="Title 1">
-            <a:extLst>
-              <a:ext uri="{FF2B5EF4-FFF2-40B4-BE49-F238E27FC236}">
-                <a16:creationId xmlns:a16="http://schemas.microsoft.com/office/drawing/2014/main" id="{E9DE2544-553D-4167-8436-DADC207FD46C}"/>
-              </a:ext>
-            </a:extLst>
-          </p:cNvPr>
+          <p:cNvPr id="2" name="Title 1"/>
           <p:cNvSpPr>
             <a:spLocks noGrp="1"/>
           </p:cNvSpPr>
@@ -766,27 +1072,44 @@
             <p:ph type="title"/>
           </p:nvPr>
         </p:nvSpPr>
-        <p:spPr/>
-        <p:txBody>
-          <a:bodyPr/>
-          <a:lstStyle/>
+        <p:spPr>
+          <a:xfrm>
+            <a:off x="599765" y="299116"/>
+            <a:ext cx="11012131" cy="1018035"/>
+          </a:xfrm>
+        </p:spPr>
+        <p:txBody>
+          <a:bodyPr>
+            <a:normAutofit/>
+          </a:bodyPr>
+          <a:lstStyle>
+            <a:lvl1pPr algn="r">
+              <a:defRPr sz="4800" baseline="0">
+                <a:solidFill>
+                  <a:srgbClr val="002060"/>
+                </a:solidFill>
+                <a:effectLst>
+                  <a:outerShdw blurRad="50800" dist="38100" dir="2700000" algn="tl" rotWithShape="0">
+                    <a:prstClr val="black">
+                      <a:alpha val="40000"/>
+                    </a:prstClr>
+                  </a:outerShdw>
+                </a:effectLst>
+              </a:defRPr>
+            </a:lvl1pPr>
+          </a:lstStyle>
           <a:p>
             <a:r>
               <a:rPr lang="en-US"/>
               <a:t>Click to edit Master title style</a:t>
             </a:r>
-          </a:p>
-        </p:txBody>
-      </p:sp>
-      <p:sp>
-        <p:nvSpPr>
-          <p:cNvPr id="3" name="Content Placeholder 2">
-            <a:extLst>
-              <a:ext uri="{FF2B5EF4-FFF2-40B4-BE49-F238E27FC236}">
-                <a16:creationId xmlns:a16="http://schemas.microsoft.com/office/drawing/2014/main" id="{F18EC91E-DB75-40E2-AC14-FC79C231A094}"/>
-              </a:ext>
-            </a:extLst>
-          </p:cNvPr>
+            <a:endParaRPr lang="en-US" dirty="0"/>
+          </a:p>
+        </p:txBody>
+      </p:sp>
+      <p:sp>
+        <p:nvSpPr>
+          <p:cNvPr id="3" name="Content Placeholder 2"/>
           <p:cNvSpPr>
             <a:spLocks noGrp="1"/>
           </p:cNvSpPr>
@@ -794,10 +1117,51 @@
             <p:ph idx="1"/>
           </p:nvPr>
         </p:nvSpPr>
-        <p:spPr/>
-        <p:txBody>
-          <a:bodyPr/>
-          <a:lstStyle/>
+        <p:spPr>
+          <a:xfrm>
+            <a:off x="618285" y="1887793"/>
+            <a:ext cx="10994760" cy="4483507"/>
+          </a:xfrm>
+        </p:spPr>
+        <p:txBody>
+          <a:bodyPr/>
+          <a:lstStyle>
+            <a:lvl1pPr algn="l">
+              <a:defRPr sz="3733">
+                <a:solidFill>
+                  <a:srgbClr val="002060"/>
+                </a:solidFill>
+              </a:defRPr>
+            </a:lvl1pPr>
+            <a:lvl2pPr algn="l">
+              <a:defRPr>
+                <a:solidFill>
+                  <a:srgbClr val="002060"/>
+                </a:solidFill>
+              </a:defRPr>
+            </a:lvl2pPr>
+            <a:lvl3pPr algn="l">
+              <a:defRPr>
+                <a:solidFill>
+                  <a:srgbClr val="002060"/>
+                </a:solidFill>
+              </a:defRPr>
+            </a:lvl3pPr>
+            <a:lvl4pPr algn="l">
+              <a:defRPr>
+                <a:solidFill>
+                  <a:srgbClr val="002060"/>
+                </a:solidFill>
+              </a:defRPr>
+            </a:lvl4pPr>
+            <a:lvl5pPr algn="l">
+              <a:defRPr>
+                <a:solidFill>
+                  <a:srgbClr val="002060"/>
+                </a:solidFill>
+              </a:defRPr>
+            </a:lvl5pPr>
+          </a:lstStyle>
           <a:p>
             <a:pPr lvl="0"/>
             <a:r>
@@ -832,18 +1196,13 @@
               <a:rPr lang="en-US"/>
               <a:t>Fifth level</a:t>
             </a:r>
-          </a:p>
-        </p:txBody>
-      </p:sp>
-      <p:sp>
-        <p:nvSpPr>
-          <p:cNvPr id="4" name="Date Placeholder 3">
-            <a:extLst>
-              <a:ext uri="{FF2B5EF4-FFF2-40B4-BE49-F238E27FC236}">
-                <a16:creationId xmlns:a16="http://schemas.microsoft.com/office/drawing/2014/main" id="{CE29F48F-D370-4889-8ED8-401EE6B1F4FC}"/>
-              </a:ext>
-            </a:extLst>
-          </p:cNvPr>
+            <a:endParaRPr lang="en-US" dirty="0"/>
+          </a:p>
+        </p:txBody>
+      </p:sp>
+      <p:sp>
+        <p:nvSpPr>
+          <p:cNvPr id="4" name="Date Placeholder 3"/>
           <p:cNvSpPr>
             <a:spLocks noGrp="1"/>
           </p:cNvSpPr>
@@ -866,13 +1225,7 @@
       </p:sp>
       <p:sp>
         <p:nvSpPr>
-          <p:cNvPr id="5" name="Footer Placeholder 4">
-            <a:extLst>
-              <a:ext uri="{FF2B5EF4-FFF2-40B4-BE49-F238E27FC236}">
-                <a16:creationId xmlns:a16="http://schemas.microsoft.com/office/drawing/2014/main" id="{8C2AEE1F-F236-4936-B073-3863D16F82AA}"/>
-              </a:ext>
-            </a:extLst>
-          </p:cNvPr>
+          <p:cNvPr id="5" name="Footer Placeholder 4"/>
           <p:cNvSpPr>
             <a:spLocks noGrp="1"/>
           </p:cNvSpPr>
@@ -891,13 +1244,7 @@
       </p:sp>
       <p:sp>
         <p:nvSpPr>
-          <p:cNvPr id="6" name="Slide Number Placeholder 5">
-            <a:extLst>
-              <a:ext uri="{FF2B5EF4-FFF2-40B4-BE49-F238E27FC236}">
-                <a16:creationId xmlns:a16="http://schemas.microsoft.com/office/drawing/2014/main" id="{34DDC100-E6A0-4172-8103-D82202E48FFA}"/>
-              </a:ext>
-            </a:extLst>
-          </p:cNvPr>
+          <p:cNvPr id="6" name="Slide Number Placeholder 5"/>
           <p:cNvSpPr>
             <a:spLocks noGrp="1"/>
           </p:cNvSpPr>
@@ -921,7 +1268,7 @@
     </p:spTree>
     <p:extLst>
       <p:ext uri="{BB962C8B-B14F-4D97-AF65-F5344CB8AC3E}">
-        <p14:creationId xmlns:p14="http://schemas.microsoft.com/office/powerpoint/2010/main" val="2375699206"/>
+        <p14:creationId xmlns:p14="http://schemas.microsoft.com/office/powerpoint/2010/main" val="1901135080"/>
       </p:ext>
     </p:extLst>
   </p:cSld>
@@ -932,6 +1279,253 @@
 </file>
 
 <file path=ppt/slideLayouts/slideLayout3.xml><?xml version="1.0" encoding="utf-8"?>
+<p:sldLayout xmlns:a="http://schemas.openxmlformats.org/drawingml/2006/main" xmlns:r="http://schemas.openxmlformats.org/officeDocument/2006/relationships" xmlns:p="http://schemas.openxmlformats.org/presentationml/2006/main" type="obj" preserve="1">
+  <p:cSld name="1_Title and Content">
+    <p:bg>
+      <p:bgPr>
+        <a:blipFill dpi="0" rotWithShape="1">
+          <a:blip r:embed="rId2">
+            <a:lum/>
+          </a:blip>
+          <a:srcRect/>
+          <a:stretch>
+            <a:fillRect/>
+          </a:stretch>
+        </a:blipFill>
+        <a:effectLst/>
+      </p:bgPr>
+    </p:bg>
+    <p:spTree>
+      <p:nvGrpSpPr>
+        <p:cNvPr id="1" name=""/>
+        <p:cNvGrpSpPr/>
+        <p:nvPr/>
+      </p:nvGrpSpPr>
+      <p:grpSpPr>
+        <a:xfrm>
+          <a:off x="0" y="0"/>
+          <a:ext cx="0" cy="0"/>
+          <a:chOff x="0" y="0"/>
+          <a:chExt cx="0" cy="0"/>
+        </a:xfrm>
+      </p:grpSpPr>
+      <p:sp>
+        <p:nvSpPr>
+          <p:cNvPr id="2" name="Title 1"/>
+          <p:cNvSpPr>
+            <a:spLocks noGrp="1"/>
+          </p:cNvSpPr>
+          <p:nvPr>
+            <p:ph type="title"/>
+          </p:nvPr>
+        </p:nvSpPr>
+        <p:spPr>
+          <a:xfrm>
+            <a:off x="2289164" y="542050"/>
+            <a:ext cx="9250513" cy="967132"/>
+          </a:xfrm>
+        </p:spPr>
+        <p:txBody>
+          <a:bodyPr>
+            <a:normAutofit/>
+          </a:bodyPr>
+          <a:lstStyle>
+            <a:lvl1pPr algn="l">
+              <a:defRPr sz="4800">
+                <a:solidFill>
+                  <a:srgbClr val="002060"/>
+                </a:solidFill>
+                <a:effectLst>
+                  <a:outerShdw blurRad="50800" dist="38100" dir="2700000" algn="tl" rotWithShape="0">
+                    <a:prstClr val="black">
+                      <a:alpha val="40000"/>
+                    </a:prstClr>
+                  </a:outerShdw>
+                </a:effectLst>
+              </a:defRPr>
+            </a:lvl1pPr>
+          </a:lstStyle>
+          <a:p>
+            <a:r>
+              <a:rPr lang="en-US"/>
+              <a:t>Click to edit Master title style</a:t>
+            </a:r>
+            <a:endParaRPr lang="en-US" dirty="0"/>
+          </a:p>
+        </p:txBody>
+      </p:sp>
+      <p:sp>
+        <p:nvSpPr>
+          <p:cNvPr id="3" name="Content Placeholder 2"/>
+          <p:cNvSpPr>
+            <a:spLocks noGrp="1"/>
+          </p:cNvSpPr>
+          <p:nvPr>
+            <p:ph idx="1"/>
+          </p:nvPr>
+        </p:nvSpPr>
+        <p:spPr>
+          <a:xfrm>
+            <a:off x="2290915" y="1524001"/>
+            <a:ext cx="9281653" cy="4727329"/>
+          </a:xfrm>
+        </p:spPr>
+        <p:txBody>
+          <a:bodyPr/>
+          <a:lstStyle>
+            <a:lvl1pPr>
+              <a:defRPr sz="3733">
+                <a:solidFill>
+                  <a:srgbClr val="002060"/>
+                </a:solidFill>
+              </a:defRPr>
+            </a:lvl1pPr>
+            <a:lvl2pPr>
+              <a:defRPr>
+                <a:solidFill>
+                  <a:srgbClr val="002060"/>
+                </a:solidFill>
+              </a:defRPr>
+            </a:lvl2pPr>
+            <a:lvl3pPr>
+              <a:defRPr>
+                <a:solidFill>
+                  <a:srgbClr val="002060"/>
+                </a:solidFill>
+              </a:defRPr>
+            </a:lvl3pPr>
+            <a:lvl4pPr>
+              <a:defRPr>
+                <a:solidFill>
+                  <a:srgbClr val="002060"/>
+                </a:solidFill>
+              </a:defRPr>
+            </a:lvl4pPr>
+            <a:lvl5pPr>
+              <a:defRPr>
+                <a:solidFill>
+                  <a:srgbClr val="002060"/>
+                </a:solidFill>
+              </a:defRPr>
+            </a:lvl5pPr>
+          </a:lstStyle>
+          <a:p>
+            <a:pPr lvl="0"/>
+            <a:r>
+              <a:rPr lang="en-US"/>
+              <a:t>Click to edit Master text styles</a:t>
+            </a:r>
+          </a:p>
+          <a:p>
+            <a:pPr lvl="1"/>
+            <a:r>
+              <a:rPr lang="en-US"/>
+              <a:t>Second level</a:t>
+            </a:r>
+          </a:p>
+          <a:p>
+            <a:pPr lvl="2"/>
+            <a:r>
+              <a:rPr lang="en-US"/>
+              <a:t>Third level</a:t>
+            </a:r>
+          </a:p>
+          <a:p>
+            <a:pPr lvl="3"/>
+            <a:r>
+              <a:rPr lang="en-US"/>
+              <a:t>Fourth level</a:t>
+            </a:r>
+          </a:p>
+          <a:p>
+            <a:pPr lvl="4"/>
+            <a:r>
+              <a:rPr lang="en-US"/>
+              <a:t>Fifth level</a:t>
+            </a:r>
+            <a:endParaRPr lang="en-US" dirty="0"/>
+          </a:p>
+        </p:txBody>
+      </p:sp>
+      <p:sp>
+        <p:nvSpPr>
+          <p:cNvPr id="4" name="Date Placeholder 3"/>
+          <p:cNvSpPr>
+            <a:spLocks noGrp="1"/>
+          </p:cNvSpPr>
+          <p:nvPr>
+            <p:ph type="dt" sz="half" idx="10"/>
+          </p:nvPr>
+        </p:nvSpPr>
+        <p:spPr/>
+        <p:txBody>
+          <a:bodyPr/>
+          <a:lstStyle/>
+          <a:p>
+            <a:fld id="{275923A7-394F-45B3-B9E8-A742D4C55B21}" type="datetimeFigureOut">
+              <a:rPr lang="en-US" smtClean="0"/>
+              <a:t>11/6/2019</a:t>
+            </a:fld>
+            <a:endParaRPr lang="en-US"/>
+          </a:p>
+        </p:txBody>
+      </p:sp>
+      <p:sp>
+        <p:nvSpPr>
+          <p:cNvPr id="5" name="Footer Placeholder 4"/>
+          <p:cNvSpPr>
+            <a:spLocks noGrp="1"/>
+          </p:cNvSpPr>
+          <p:nvPr>
+            <p:ph type="ftr" sz="quarter" idx="11"/>
+          </p:nvPr>
+        </p:nvSpPr>
+        <p:spPr/>
+        <p:txBody>
+          <a:bodyPr/>
+          <a:lstStyle/>
+          <a:p>
+            <a:endParaRPr lang="en-US"/>
+          </a:p>
+        </p:txBody>
+      </p:sp>
+      <p:sp>
+        <p:nvSpPr>
+          <p:cNvPr id="6" name="Slide Number Placeholder 5"/>
+          <p:cNvSpPr>
+            <a:spLocks noGrp="1"/>
+          </p:cNvSpPr>
+          <p:nvPr>
+            <p:ph type="sldNum" sz="quarter" idx="12"/>
+          </p:nvPr>
+        </p:nvSpPr>
+        <p:spPr/>
+        <p:txBody>
+          <a:bodyPr/>
+          <a:lstStyle/>
+          <a:p>
+            <a:fld id="{24E8BC4F-5068-4953-8B8F-C824F90EC491}" type="slidenum">
+              <a:rPr lang="en-US" smtClean="0"/>
+              <a:t>‹#›</a:t>
+            </a:fld>
+            <a:endParaRPr lang="en-US"/>
+          </a:p>
+        </p:txBody>
+      </p:sp>
+    </p:spTree>
+    <p:extLst>
+      <p:ext uri="{BB962C8B-B14F-4D97-AF65-F5344CB8AC3E}">
+        <p14:creationId xmlns:p14="http://schemas.microsoft.com/office/powerpoint/2010/main" val="365427834"/>
+      </p:ext>
+    </p:extLst>
+  </p:cSld>
+  <p:clrMapOvr>
+    <a:masterClrMapping/>
+  </p:clrMapOvr>
+</p:sldLayout>
+</file>
+
+<file path=ppt/slideLayouts/slideLayout4.xml><?xml version="1.0" encoding="utf-8"?>
 <p:sldLayout xmlns:a="http://schemas.openxmlformats.org/drawingml/2006/main" xmlns:r="http://schemas.openxmlformats.org/officeDocument/2006/relationships" xmlns:p="http://schemas.openxmlformats.org/presentationml/2006/main" type="secHead" preserve="1">
   <p:cSld name="Section Header">
     <p:spTree>
@@ -950,13 +1544,7 @@
       </p:grpSpPr>
       <p:sp>
         <p:nvSpPr>
-          <p:cNvPr id="2" name="Title 1">
-            <a:extLst>
-              <a:ext uri="{FF2B5EF4-FFF2-40B4-BE49-F238E27FC236}">
-                <a16:creationId xmlns:a16="http://schemas.microsoft.com/office/drawing/2014/main" id="{29A93DEE-A943-4DFE-A931-17F8B870D4F1}"/>
-              </a:ext>
-            </a:extLst>
-          </p:cNvPr>
+          <p:cNvPr id="2" name="Title 1"/>
           <p:cNvSpPr>
             <a:spLocks noGrp="1"/>
           </p:cNvSpPr>
@@ -966,53 +1554,47 @@
         </p:nvSpPr>
         <p:spPr>
           <a:xfrm>
-            <a:off x="831850" y="1709738"/>
-            <a:ext cx="10515600" cy="2852737"/>
+            <a:off x="963084" y="4406901"/>
+            <a:ext cx="10363200" cy="1362075"/>
           </a:xfrm>
         </p:spPr>
         <p:txBody>
+          <a:bodyPr anchor="t"/>
+          <a:lstStyle>
+            <a:lvl1pPr algn="l">
+              <a:defRPr sz="5333" b="1" cap="all"/>
+            </a:lvl1pPr>
+          </a:lstStyle>
+          <a:p>
+            <a:r>
+              <a:rPr lang="en-US"/>
+              <a:t>Click to edit Master title style</a:t>
+            </a:r>
+          </a:p>
+        </p:txBody>
+      </p:sp>
+      <p:sp>
+        <p:nvSpPr>
+          <p:cNvPr id="3" name="Text Placeholder 2"/>
+          <p:cNvSpPr>
+            <a:spLocks noGrp="1"/>
+          </p:cNvSpPr>
+          <p:nvPr>
+            <p:ph type="body" idx="1"/>
+          </p:nvPr>
+        </p:nvSpPr>
+        <p:spPr>
+          <a:xfrm>
+            <a:off x="963084" y="2906713"/>
+            <a:ext cx="10363200" cy="1500187"/>
+          </a:xfrm>
+        </p:spPr>
+        <p:txBody>
           <a:bodyPr anchor="b"/>
           <a:lstStyle>
-            <a:lvl1pPr>
-              <a:defRPr sz="6000"/>
-            </a:lvl1pPr>
-          </a:lstStyle>
-          <a:p>
-            <a:r>
-              <a:rPr lang="en-US"/>
-              <a:t>Click to edit Master title style</a:t>
-            </a:r>
-          </a:p>
-        </p:txBody>
-      </p:sp>
-      <p:sp>
-        <p:nvSpPr>
-          <p:cNvPr id="3" name="Text Placeholder 2">
-            <a:extLst>
-              <a:ext uri="{FF2B5EF4-FFF2-40B4-BE49-F238E27FC236}">
-                <a16:creationId xmlns:a16="http://schemas.microsoft.com/office/drawing/2014/main" id="{DB83DF3F-01A4-4776-80CE-E1B56FDE6FE7}"/>
-              </a:ext>
-            </a:extLst>
-          </p:cNvPr>
-          <p:cNvSpPr>
-            <a:spLocks noGrp="1"/>
-          </p:cNvSpPr>
-          <p:nvPr>
-            <p:ph type="body" idx="1"/>
-          </p:nvPr>
-        </p:nvSpPr>
-        <p:spPr>
-          <a:xfrm>
-            <a:off x="831850" y="4589463"/>
-            <a:ext cx="10515600" cy="1500187"/>
-          </a:xfrm>
-        </p:spPr>
-        <p:txBody>
-          <a:bodyPr/>
-          <a:lstStyle>
             <a:lvl1pPr marL="0" indent="0">
               <a:buNone/>
-              <a:defRPr sz="2400">
+              <a:defRPr sz="2667">
                 <a:solidFill>
                   <a:schemeClr val="tx1">
                     <a:tint val="75000"/>
@@ -1020,9 +1602,9 @@
                 </a:solidFill>
               </a:defRPr>
             </a:lvl1pPr>
-            <a:lvl2pPr marL="457200" indent="0">
-              <a:buNone/>
-              <a:defRPr sz="2000">
+            <a:lvl2pPr marL="609585" indent="0">
+              <a:buNone/>
+              <a:defRPr sz="2400">
                 <a:solidFill>
                   <a:schemeClr val="tx1">
                     <a:tint val="75000"/>
@@ -1030,9 +1612,9 @@
                 </a:solidFill>
               </a:defRPr>
             </a:lvl2pPr>
-            <a:lvl3pPr marL="914400" indent="0">
-              <a:buNone/>
-              <a:defRPr sz="1800">
+            <a:lvl3pPr marL="1219170" indent="0">
+              <a:buNone/>
+              <a:defRPr sz="2133">
                 <a:solidFill>
                   <a:schemeClr val="tx1">
                     <a:tint val="75000"/>
@@ -1040,9 +1622,9 @@
                 </a:solidFill>
               </a:defRPr>
             </a:lvl3pPr>
-            <a:lvl4pPr marL="1371600" indent="0">
-              <a:buNone/>
-              <a:defRPr sz="1600">
+            <a:lvl4pPr marL="1828754" indent="0">
+              <a:buNone/>
+              <a:defRPr sz="1867">
                 <a:solidFill>
                   <a:schemeClr val="tx1">
                     <a:tint val="75000"/>
@@ -1050,9 +1632,9 @@
                 </a:solidFill>
               </a:defRPr>
             </a:lvl4pPr>
-            <a:lvl5pPr marL="1828800" indent="0">
-              <a:buNone/>
-              <a:defRPr sz="1600">
+            <a:lvl5pPr marL="2438339" indent="0">
+              <a:buNone/>
+              <a:defRPr sz="1867">
                 <a:solidFill>
                   <a:schemeClr val="tx1">
                     <a:tint val="75000"/>
@@ -1060,9 +1642,9 @@
                 </a:solidFill>
               </a:defRPr>
             </a:lvl5pPr>
-            <a:lvl6pPr marL="2286000" indent="0">
-              <a:buNone/>
-              <a:defRPr sz="1600">
+            <a:lvl6pPr marL="3047924" indent="0">
+              <a:buNone/>
+              <a:defRPr sz="1867">
                 <a:solidFill>
                   <a:schemeClr val="tx1">
                     <a:tint val="75000"/>
@@ -1070,9 +1652,9 @@
                 </a:solidFill>
               </a:defRPr>
             </a:lvl6pPr>
-            <a:lvl7pPr marL="2743200" indent="0">
-              <a:buNone/>
-              <a:defRPr sz="1600">
+            <a:lvl7pPr marL="3657509" indent="0">
+              <a:buNone/>
+              <a:defRPr sz="1867">
                 <a:solidFill>
                   <a:schemeClr val="tx1">
                     <a:tint val="75000"/>
@@ -1080,9 +1662,9 @@
                 </a:solidFill>
               </a:defRPr>
             </a:lvl7pPr>
-            <a:lvl8pPr marL="3200400" indent="0">
-              <a:buNone/>
-              <a:defRPr sz="1600">
+            <a:lvl8pPr marL="4267093" indent="0">
+              <a:buNone/>
+              <a:defRPr sz="1867">
                 <a:solidFill>
                   <a:schemeClr val="tx1">
                     <a:tint val="75000"/>
@@ -1090,9 +1672,9 @@
                 </a:solidFill>
               </a:defRPr>
             </a:lvl8pPr>
-            <a:lvl9pPr marL="3657600" indent="0">
-              <a:buNone/>
-              <a:defRPr sz="1600">
+            <a:lvl9pPr marL="4876678" indent="0">
+              <a:buNone/>
+              <a:defRPr sz="1867">
                 <a:solidFill>
                   <a:schemeClr val="tx1">
                     <a:tint val="75000"/>
@@ -1112,13 +1694,7 @@
       </p:sp>
       <p:sp>
         <p:nvSpPr>
-          <p:cNvPr id="4" name="Date Placeholder 3">
-            <a:extLst>
-              <a:ext uri="{FF2B5EF4-FFF2-40B4-BE49-F238E27FC236}">
-                <a16:creationId xmlns:a16="http://schemas.microsoft.com/office/drawing/2014/main" id="{A677D424-9644-4E36-9C23-8F8B8CC93630}"/>
-              </a:ext>
-            </a:extLst>
-          </p:cNvPr>
+          <p:cNvPr id="4" name="Date Placeholder 3"/>
           <p:cNvSpPr>
             <a:spLocks noGrp="1"/>
           </p:cNvSpPr>
@@ -1141,13 +1717,7 @@
       </p:sp>
       <p:sp>
         <p:nvSpPr>
-          <p:cNvPr id="5" name="Footer Placeholder 4">
-            <a:extLst>
-              <a:ext uri="{FF2B5EF4-FFF2-40B4-BE49-F238E27FC236}">
-                <a16:creationId xmlns:a16="http://schemas.microsoft.com/office/drawing/2014/main" id="{1C72DBBC-4D87-4726-B4D9-AD19F5B6CA50}"/>
-              </a:ext>
-            </a:extLst>
-          </p:cNvPr>
+          <p:cNvPr id="5" name="Footer Placeholder 4"/>
           <p:cNvSpPr>
             <a:spLocks noGrp="1"/>
           </p:cNvSpPr>
@@ -1166,13 +1736,7 @@
       </p:sp>
       <p:sp>
         <p:nvSpPr>
-          <p:cNvPr id="6" name="Slide Number Placeholder 5">
-            <a:extLst>
-              <a:ext uri="{FF2B5EF4-FFF2-40B4-BE49-F238E27FC236}">
-                <a16:creationId xmlns:a16="http://schemas.microsoft.com/office/drawing/2014/main" id="{B5E058BF-1AFF-4020-AE56-2FF1BFFBFFDA}"/>
-              </a:ext>
-            </a:extLst>
-          </p:cNvPr>
+          <p:cNvPr id="6" name="Slide Number Placeholder 5"/>
           <p:cNvSpPr>
             <a:spLocks noGrp="1"/>
           </p:cNvSpPr>
@@ -1196,7 +1760,7 @@
     </p:spTree>
     <p:extLst>
       <p:ext uri="{BB962C8B-B14F-4D97-AF65-F5344CB8AC3E}">
-        <p14:creationId xmlns:p14="http://schemas.microsoft.com/office/powerpoint/2010/main" val="2387278923"/>
+        <p14:creationId xmlns:p14="http://schemas.microsoft.com/office/powerpoint/2010/main" val="697534935"/>
       </p:ext>
     </p:extLst>
   </p:cSld>
@@ -1206,7 +1770,7 @@
 </p:sldLayout>
 </file>
 
-<file path=ppt/slideLayouts/slideLayout4.xml><?xml version="1.0" encoding="utf-8"?>
+<file path=ppt/slideLayouts/slideLayout5.xml><?xml version="1.0" encoding="utf-8"?>
 <p:sldLayout xmlns:a="http://schemas.openxmlformats.org/drawingml/2006/main" xmlns:r="http://schemas.openxmlformats.org/officeDocument/2006/relationships" xmlns:p="http://schemas.openxmlformats.org/presentationml/2006/main" type="twoObj" preserve="1">
   <p:cSld name="Two Content">
     <p:spTree>
@@ -1225,13 +1789,7 @@
       </p:grpSpPr>
       <p:sp>
         <p:nvSpPr>
-          <p:cNvPr id="2" name="Title 1">
-            <a:extLst>
-              <a:ext uri="{FF2B5EF4-FFF2-40B4-BE49-F238E27FC236}">
-                <a16:creationId xmlns:a16="http://schemas.microsoft.com/office/drawing/2014/main" id="{4CE1FDC5-6FF1-4066-AF4A-A3D4A07E5706}"/>
-              </a:ext>
-            </a:extLst>
-          </p:cNvPr>
+          <p:cNvPr id="2" name="Title 1"/>
           <p:cNvSpPr>
             <a:spLocks noGrp="1"/>
           </p:cNvSpPr>
@@ -1253,13 +1811,7 @@
       </p:sp>
       <p:sp>
         <p:nvSpPr>
-          <p:cNvPr id="3" name="Content Placeholder 2">
-            <a:extLst>
-              <a:ext uri="{FF2B5EF4-FFF2-40B4-BE49-F238E27FC236}">
-                <a16:creationId xmlns:a16="http://schemas.microsoft.com/office/drawing/2014/main" id="{3500298D-7F4D-4A96-89BF-98B758B5B6CB}"/>
-              </a:ext>
-            </a:extLst>
-          </p:cNvPr>
+          <p:cNvPr id="3" name="Content Placeholder 2"/>
           <p:cNvSpPr>
             <a:spLocks noGrp="1"/>
           </p:cNvSpPr>
@@ -1269,13 +1821,41 @@
         </p:nvSpPr>
         <p:spPr>
           <a:xfrm>
-            <a:off x="838200" y="1825625"/>
-            <a:ext cx="5181600" cy="4351338"/>
+            <a:off x="609600" y="1600201"/>
+            <a:ext cx="5384800" cy="4525963"/>
           </a:xfrm>
         </p:spPr>
         <p:txBody>
           <a:bodyPr/>
-          <a:lstStyle/>
+          <a:lstStyle>
+            <a:lvl1pPr>
+              <a:defRPr sz="3733"/>
+            </a:lvl1pPr>
+            <a:lvl2pPr>
+              <a:defRPr sz="3200"/>
+            </a:lvl2pPr>
+            <a:lvl3pPr>
+              <a:defRPr sz="2667"/>
+            </a:lvl3pPr>
+            <a:lvl4pPr>
+              <a:defRPr sz="2400"/>
+            </a:lvl4pPr>
+            <a:lvl5pPr>
+              <a:defRPr sz="2400"/>
+            </a:lvl5pPr>
+            <a:lvl6pPr>
+              <a:defRPr sz="2400"/>
+            </a:lvl6pPr>
+            <a:lvl7pPr>
+              <a:defRPr sz="2400"/>
+            </a:lvl7pPr>
+            <a:lvl8pPr>
+              <a:defRPr sz="2400"/>
+            </a:lvl8pPr>
+            <a:lvl9pPr>
+              <a:defRPr sz="2400"/>
+            </a:lvl9pPr>
+          </a:lstStyle>
           <a:p>
             <a:pPr lvl="0"/>
             <a:r>
@@ -1315,13 +1895,7 @@
       </p:sp>
       <p:sp>
         <p:nvSpPr>
-          <p:cNvPr id="4" name="Content Placeholder 3">
-            <a:extLst>
-              <a:ext uri="{FF2B5EF4-FFF2-40B4-BE49-F238E27FC236}">
-                <a16:creationId xmlns:a16="http://schemas.microsoft.com/office/drawing/2014/main" id="{0BFDB457-53AD-4830-B42D-A7D47E85B94E}"/>
-              </a:ext>
-            </a:extLst>
-          </p:cNvPr>
+          <p:cNvPr id="4" name="Content Placeholder 3"/>
           <p:cNvSpPr>
             <a:spLocks noGrp="1"/>
           </p:cNvSpPr>
@@ -1331,13 +1905,41 @@
         </p:nvSpPr>
         <p:spPr>
           <a:xfrm>
-            <a:off x="6172200" y="1825625"/>
-            <a:ext cx="5181600" cy="4351338"/>
+            <a:off x="6197600" y="1600201"/>
+            <a:ext cx="5384800" cy="4525963"/>
           </a:xfrm>
         </p:spPr>
         <p:txBody>
           <a:bodyPr/>
-          <a:lstStyle/>
+          <a:lstStyle>
+            <a:lvl1pPr>
+              <a:defRPr sz="3733"/>
+            </a:lvl1pPr>
+            <a:lvl2pPr>
+              <a:defRPr sz="3200"/>
+            </a:lvl2pPr>
+            <a:lvl3pPr>
+              <a:defRPr sz="2667"/>
+            </a:lvl3pPr>
+            <a:lvl4pPr>
+              <a:defRPr sz="2400"/>
+            </a:lvl4pPr>
+            <a:lvl5pPr>
+              <a:defRPr sz="2400"/>
+            </a:lvl5pPr>
+            <a:lvl6pPr>
+              <a:defRPr sz="2400"/>
+            </a:lvl6pPr>
+            <a:lvl7pPr>
+              <a:defRPr sz="2400"/>
+            </a:lvl7pPr>
+            <a:lvl8pPr>
+              <a:defRPr sz="2400"/>
+            </a:lvl8pPr>
+            <a:lvl9pPr>
+              <a:defRPr sz="2400"/>
+            </a:lvl9pPr>
+          </a:lstStyle>
           <a:p>
             <a:pPr lvl="0"/>
             <a:r>
@@ -1377,13 +1979,7 @@
       </p:sp>
       <p:sp>
         <p:nvSpPr>
-          <p:cNvPr id="5" name="Date Placeholder 4">
-            <a:extLst>
-              <a:ext uri="{FF2B5EF4-FFF2-40B4-BE49-F238E27FC236}">
-                <a16:creationId xmlns:a16="http://schemas.microsoft.com/office/drawing/2014/main" id="{568F36E6-F388-4179-AC9C-FB881F8FC2E1}"/>
-              </a:ext>
-            </a:extLst>
-          </p:cNvPr>
+          <p:cNvPr id="5" name="Date Placeholder 4"/>
           <p:cNvSpPr>
             <a:spLocks noGrp="1"/>
           </p:cNvSpPr>
@@ -1406,13 +2002,7 @@
       </p:sp>
       <p:sp>
         <p:nvSpPr>
-          <p:cNvPr id="6" name="Footer Placeholder 5">
-            <a:extLst>
-              <a:ext uri="{FF2B5EF4-FFF2-40B4-BE49-F238E27FC236}">
-                <a16:creationId xmlns:a16="http://schemas.microsoft.com/office/drawing/2014/main" id="{52E9A984-BEB1-4C72-877F-A9E68E70FE9E}"/>
-              </a:ext>
-            </a:extLst>
-          </p:cNvPr>
+          <p:cNvPr id="6" name="Footer Placeholder 5"/>
           <p:cNvSpPr>
             <a:spLocks noGrp="1"/>
           </p:cNvSpPr>
@@ -1431,13 +2021,7 @@
       </p:sp>
       <p:sp>
         <p:nvSpPr>
-          <p:cNvPr id="7" name="Slide Number Placeholder 6">
-            <a:extLst>
-              <a:ext uri="{FF2B5EF4-FFF2-40B4-BE49-F238E27FC236}">
-                <a16:creationId xmlns:a16="http://schemas.microsoft.com/office/drawing/2014/main" id="{AB823D2A-FF38-4571-91B3-F005CF8413B5}"/>
-              </a:ext>
-            </a:extLst>
-          </p:cNvPr>
+          <p:cNvPr id="7" name="Slide Number Placeholder 6"/>
           <p:cNvSpPr>
             <a:spLocks noGrp="1"/>
           </p:cNvSpPr>
@@ -1461,7 +2045,7 @@
     </p:spTree>
     <p:extLst>
       <p:ext uri="{BB962C8B-B14F-4D97-AF65-F5344CB8AC3E}">
-        <p14:creationId xmlns:p14="http://schemas.microsoft.com/office/powerpoint/2010/main" val="3739637422"/>
+        <p14:creationId xmlns:p14="http://schemas.microsoft.com/office/powerpoint/2010/main" val="2190656614"/>
       </p:ext>
     </p:extLst>
   </p:cSld>
@@ -1471,7 +2055,7 @@
 </p:sldLayout>
 </file>
 
-<file path=ppt/slideLayouts/slideLayout5.xml><?xml version="1.0" encoding="utf-8"?>
+<file path=ppt/slideLayouts/slideLayout6.xml><?xml version="1.0" encoding="utf-8"?>
 <p:sldLayout xmlns:a="http://schemas.openxmlformats.org/drawingml/2006/main" xmlns:r="http://schemas.openxmlformats.org/officeDocument/2006/relationships" xmlns:p="http://schemas.openxmlformats.org/presentationml/2006/main" type="twoTxTwoObj" preserve="1">
   <p:cSld name="Comparison">
     <p:spTree>
@@ -1490,13 +2074,7 @@
       </p:grpSpPr>
       <p:sp>
         <p:nvSpPr>
-          <p:cNvPr id="2" name="Title 1">
-            <a:extLst>
-              <a:ext uri="{FF2B5EF4-FFF2-40B4-BE49-F238E27FC236}">
-                <a16:creationId xmlns:a16="http://schemas.microsoft.com/office/drawing/2014/main" id="{F1205667-BE85-4246-93C6-816170765C85}"/>
-              </a:ext>
-            </a:extLst>
-          </p:cNvPr>
+          <p:cNvPr id="2" name="Title 1"/>
           <p:cNvSpPr>
             <a:spLocks noGrp="1"/>
           </p:cNvSpPr>
@@ -1506,30 +2084,42 @@
         </p:nvSpPr>
         <p:spPr>
           <a:xfrm>
-            <a:off x="839788" y="365125"/>
-            <a:ext cx="10515600" cy="1325563"/>
+            <a:off x="700425" y="283536"/>
+            <a:ext cx="10791153" cy="1018033"/>
           </a:xfrm>
         </p:spPr>
         <p:txBody>
-          <a:bodyPr/>
-          <a:lstStyle/>
+          <a:bodyPr>
+            <a:normAutofit/>
+          </a:bodyPr>
+          <a:lstStyle>
+            <a:lvl1pPr algn="r">
+              <a:defRPr sz="4800" baseline="0">
+                <a:solidFill>
+                  <a:srgbClr val="002060"/>
+                </a:solidFill>
+                <a:effectLst>
+                  <a:outerShdw blurRad="50800" dist="38100" dir="2700000" algn="tl" rotWithShape="0">
+                    <a:prstClr val="black">
+                      <a:alpha val="40000"/>
+                    </a:prstClr>
+                  </a:outerShdw>
+                </a:effectLst>
+              </a:defRPr>
+            </a:lvl1pPr>
+          </a:lstStyle>
           <a:p>
             <a:r>
               <a:rPr lang="en-US"/>
               <a:t>Click to edit Master title style</a:t>
             </a:r>
-          </a:p>
-        </p:txBody>
-      </p:sp>
-      <p:sp>
-        <p:nvSpPr>
-          <p:cNvPr id="3" name="Text Placeholder 2">
-            <a:extLst>
-              <a:ext uri="{FF2B5EF4-FFF2-40B4-BE49-F238E27FC236}">
-                <a16:creationId xmlns:a16="http://schemas.microsoft.com/office/drawing/2014/main" id="{B9486860-E267-49B8-B7B1-63163EC409C5}"/>
-              </a:ext>
-            </a:extLst>
-          </p:cNvPr>
+            <a:endParaRPr lang="en-US" dirty="0"/>
+          </a:p>
+        </p:txBody>
+      </p:sp>
+      <p:sp>
+        <p:nvSpPr>
+          <p:cNvPr id="3" name="Text Placeholder 2"/>
           <p:cNvSpPr>
             <a:spLocks noGrp="1"/>
           </p:cNvSpPr>
@@ -1539,48 +2129,52 @@
         </p:nvSpPr>
         <p:spPr>
           <a:xfrm>
-            <a:off x="839788" y="1681163"/>
-            <a:ext cx="5157787" cy="823912"/>
+            <a:off x="696175" y="2040204"/>
+            <a:ext cx="5386917" cy="639763"/>
           </a:xfrm>
         </p:spPr>
         <p:txBody>
           <a:bodyPr anchor="b"/>
           <a:lstStyle>
-            <a:lvl1pPr marL="0" indent="0">
+            <a:lvl1pPr marL="0" indent="0" algn="ctr">
+              <a:buNone/>
+              <a:defRPr sz="3200" b="1">
+                <a:solidFill>
+                  <a:srgbClr val="002060"/>
+                </a:solidFill>
+              </a:defRPr>
+            </a:lvl1pPr>
+            <a:lvl2pPr marL="609585" indent="0">
+              <a:buNone/>
+              <a:defRPr sz="2667" b="1"/>
+            </a:lvl2pPr>
+            <a:lvl3pPr marL="1219170" indent="0">
               <a:buNone/>
               <a:defRPr sz="2400" b="1"/>
-            </a:lvl1pPr>
-            <a:lvl2pPr marL="457200" indent="0">
-              <a:buNone/>
-              <a:defRPr sz="2000" b="1"/>
-            </a:lvl2pPr>
-            <a:lvl3pPr marL="914400" indent="0">
-              <a:buNone/>
-              <a:defRPr sz="1800" b="1"/>
             </a:lvl3pPr>
-            <a:lvl4pPr marL="1371600" indent="0">
-              <a:buNone/>
-              <a:defRPr sz="1600" b="1"/>
+            <a:lvl4pPr marL="1828754" indent="0">
+              <a:buNone/>
+              <a:defRPr sz="2133" b="1"/>
             </a:lvl4pPr>
-            <a:lvl5pPr marL="1828800" indent="0">
-              <a:buNone/>
-              <a:defRPr sz="1600" b="1"/>
+            <a:lvl5pPr marL="2438339" indent="0">
+              <a:buNone/>
+              <a:defRPr sz="2133" b="1"/>
             </a:lvl5pPr>
-            <a:lvl6pPr marL="2286000" indent="0">
-              <a:buNone/>
-              <a:defRPr sz="1600" b="1"/>
+            <a:lvl6pPr marL="3047924" indent="0">
+              <a:buNone/>
+              <a:defRPr sz="2133" b="1"/>
             </a:lvl6pPr>
-            <a:lvl7pPr marL="2743200" indent="0">
-              <a:buNone/>
-              <a:defRPr sz="1600" b="1"/>
+            <a:lvl7pPr marL="3657509" indent="0">
+              <a:buNone/>
+              <a:defRPr sz="2133" b="1"/>
             </a:lvl7pPr>
-            <a:lvl8pPr marL="3200400" indent="0">
-              <a:buNone/>
-              <a:defRPr sz="1600" b="1"/>
+            <a:lvl8pPr marL="4267093" indent="0">
+              <a:buNone/>
+              <a:defRPr sz="2133" b="1"/>
             </a:lvl8pPr>
-            <a:lvl9pPr marL="3657600" indent="0">
-              <a:buNone/>
-              <a:defRPr sz="1600" b="1"/>
+            <a:lvl9pPr marL="4876678" indent="0">
+              <a:buNone/>
+              <a:defRPr sz="2133" b="1"/>
             </a:lvl9pPr>
           </a:lstStyle>
           <a:p>
@@ -1594,13 +2188,7 @@
       </p:sp>
       <p:sp>
         <p:nvSpPr>
-          <p:cNvPr id="4" name="Content Placeholder 3">
-            <a:extLst>
-              <a:ext uri="{FF2B5EF4-FFF2-40B4-BE49-F238E27FC236}">
-                <a16:creationId xmlns:a16="http://schemas.microsoft.com/office/drawing/2014/main" id="{E07F30C2-5055-402B-B7A4-5DAF4927CD0C}"/>
-              </a:ext>
-            </a:extLst>
-          </p:cNvPr>
+          <p:cNvPr id="4" name="Content Placeholder 3"/>
           <p:cNvSpPr>
             <a:spLocks noGrp="1"/>
           </p:cNvSpPr>
@@ -1610,13 +2198,61 @@
         </p:nvSpPr>
         <p:spPr>
           <a:xfrm>
-            <a:off x="839788" y="2505075"/>
-            <a:ext cx="5157787" cy="3684588"/>
+            <a:off x="696175" y="2670067"/>
+            <a:ext cx="5386917" cy="3035059"/>
           </a:xfrm>
         </p:spPr>
         <p:txBody>
           <a:bodyPr/>
-          <a:lstStyle/>
+          <a:lstStyle>
+            <a:lvl1pPr algn="ctr">
+              <a:defRPr sz="3200">
+                <a:solidFill>
+                  <a:srgbClr val="002060"/>
+                </a:solidFill>
+              </a:defRPr>
+            </a:lvl1pPr>
+            <a:lvl2pPr algn="ctr">
+              <a:defRPr sz="2667">
+                <a:solidFill>
+                  <a:srgbClr val="002060"/>
+                </a:solidFill>
+              </a:defRPr>
+            </a:lvl2pPr>
+            <a:lvl3pPr algn="ctr">
+              <a:defRPr sz="2400">
+                <a:solidFill>
+                  <a:srgbClr val="002060"/>
+                </a:solidFill>
+              </a:defRPr>
+            </a:lvl3pPr>
+            <a:lvl4pPr algn="ctr">
+              <a:defRPr sz="2133">
+                <a:solidFill>
+                  <a:srgbClr val="002060"/>
+                </a:solidFill>
+              </a:defRPr>
+            </a:lvl4pPr>
+            <a:lvl5pPr algn="ctr">
+              <a:defRPr sz="2133">
+                <a:solidFill>
+                  <a:srgbClr val="002060"/>
+                </a:solidFill>
+              </a:defRPr>
+            </a:lvl5pPr>
+            <a:lvl6pPr>
+              <a:defRPr sz="2133"/>
+            </a:lvl6pPr>
+            <a:lvl7pPr>
+              <a:defRPr sz="2133"/>
+            </a:lvl7pPr>
+            <a:lvl8pPr>
+              <a:defRPr sz="2133"/>
+            </a:lvl8pPr>
+            <a:lvl9pPr>
+              <a:defRPr sz="2133"/>
+            </a:lvl9pPr>
+          </a:lstStyle>
           <a:p>
             <a:pPr lvl="0"/>
             <a:r>
@@ -1651,18 +2287,13 @@
               <a:rPr lang="en-US"/>
               <a:t>Fifth level</a:t>
             </a:r>
-          </a:p>
-        </p:txBody>
-      </p:sp>
-      <p:sp>
-        <p:nvSpPr>
-          <p:cNvPr id="5" name="Text Placeholder 4">
-            <a:extLst>
-              <a:ext uri="{FF2B5EF4-FFF2-40B4-BE49-F238E27FC236}">
-                <a16:creationId xmlns:a16="http://schemas.microsoft.com/office/drawing/2014/main" id="{4ADB5BA8-7D84-4DEB-A77B-F4CADD7FDBAE}"/>
-              </a:ext>
-            </a:extLst>
-          </p:cNvPr>
+            <a:endParaRPr lang="en-US" dirty="0"/>
+          </a:p>
+        </p:txBody>
+      </p:sp>
+      <p:sp>
+        <p:nvSpPr>
+          <p:cNvPr id="5" name="Text Placeholder 4"/>
           <p:cNvSpPr>
             <a:spLocks noGrp="1"/>
           </p:cNvSpPr>
@@ -1672,48 +2303,52 @@
         </p:nvSpPr>
         <p:spPr>
           <a:xfrm>
-            <a:off x="6172200" y="1681163"/>
-            <a:ext cx="5183188" cy="823912"/>
+            <a:off x="6076337" y="2040204"/>
+            <a:ext cx="5389033" cy="639763"/>
           </a:xfrm>
         </p:spPr>
         <p:txBody>
           <a:bodyPr anchor="b"/>
           <a:lstStyle>
-            <a:lvl1pPr marL="0" indent="0">
+            <a:lvl1pPr marL="0" indent="0" algn="ctr">
+              <a:buNone/>
+              <a:defRPr sz="3200" b="1">
+                <a:solidFill>
+                  <a:srgbClr val="002060"/>
+                </a:solidFill>
+              </a:defRPr>
+            </a:lvl1pPr>
+            <a:lvl2pPr marL="609585" indent="0">
+              <a:buNone/>
+              <a:defRPr sz="2667" b="1"/>
+            </a:lvl2pPr>
+            <a:lvl3pPr marL="1219170" indent="0">
               <a:buNone/>
               <a:defRPr sz="2400" b="1"/>
-            </a:lvl1pPr>
-            <a:lvl2pPr marL="457200" indent="0">
-              <a:buNone/>
-              <a:defRPr sz="2000" b="1"/>
-            </a:lvl2pPr>
-            <a:lvl3pPr marL="914400" indent="0">
-              <a:buNone/>
-              <a:defRPr sz="1800" b="1"/>
             </a:lvl3pPr>
-            <a:lvl4pPr marL="1371600" indent="0">
-              <a:buNone/>
-              <a:defRPr sz="1600" b="1"/>
+            <a:lvl4pPr marL="1828754" indent="0">
+              <a:buNone/>
+              <a:defRPr sz="2133" b="1"/>
             </a:lvl4pPr>
-            <a:lvl5pPr marL="1828800" indent="0">
-              <a:buNone/>
-              <a:defRPr sz="1600" b="1"/>
+            <a:lvl5pPr marL="2438339" indent="0">
+              <a:buNone/>
+              <a:defRPr sz="2133" b="1"/>
             </a:lvl5pPr>
-            <a:lvl6pPr marL="2286000" indent="0">
-              <a:buNone/>
-              <a:defRPr sz="1600" b="1"/>
+            <a:lvl6pPr marL="3047924" indent="0">
+              <a:buNone/>
+              <a:defRPr sz="2133" b="1"/>
             </a:lvl6pPr>
-            <a:lvl7pPr marL="2743200" indent="0">
-              <a:buNone/>
-              <a:defRPr sz="1600" b="1"/>
+            <a:lvl7pPr marL="3657509" indent="0">
+              <a:buNone/>
+              <a:defRPr sz="2133" b="1"/>
             </a:lvl7pPr>
-            <a:lvl8pPr marL="3200400" indent="0">
-              <a:buNone/>
-              <a:defRPr sz="1600" b="1"/>
+            <a:lvl8pPr marL="4267093" indent="0">
+              <a:buNone/>
+              <a:defRPr sz="2133" b="1"/>
             </a:lvl8pPr>
-            <a:lvl9pPr marL="3657600" indent="0">
-              <a:buNone/>
-              <a:defRPr sz="1600" b="1"/>
+            <a:lvl9pPr marL="4876678" indent="0">
+              <a:buNone/>
+              <a:defRPr sz="2133" b="1"/>
             </a:lvl9pPr>
           </a:lstStyle>
           <a:p>
@@ -1727,13 +2362,7 @@
       </p:sp>
       <p:sp>
         <p:nvSpPr>
-          <p:cNvPr id="6" name="Content Placeholder 5">
-            <a:extLst>
-              <a:ext uri="{FF2B5EF4-FFF2-40B4-BE49-F238E27FC236}">
-                <a16:creationId xmlns:a16="http://schemas.microsoft.com/office/drawing/2014/main" id="{DBF8C8DB-03E6-4735-8D4D-48EA2DE8AE76}"/>
-              </a:ext>
-            </a:extLst>
-          </p:cNvPr>
+          <p:cNvPr id="6" name="Content Placeholder 5"/>
           <p:cNvSpPr>
             <a:spLocks noGrp="1"/>
           </p:cNvSpPr>
@@ -1743,13 +2372,61 @@
         </p:nvSpPr>
         <p:spPr>
           <a:xfrm>
-            <a:off x="6172200" y="2505075"/>
-            <a:ext cx="5183188" cy="3684588"/>
+            <a:off x="6076337" y="2670067"/>
+            <a:ext cx="5389033" cy="3035059"/>
           </a:xfrm>
         </p:spPr>
         <p:txBody>
           <a:bodyPr/>
-          <a:lstStyle/>
+          <a:lstStyle>
+            <a:lvl1pPr algn="ctr">
+              <a:defRPr sz="3200">
+                <a:solidFill>
+                  <a:srgbClr val="002060"/>
+                </a:solidFill>
+              </a:defRPr>
+            </a:lvl1pPr>
+            <a:lvl2pPr algn="ctr">
+              <a:defRPr sz="2667">
+                <a:solidFill>
+                  <a:srgbClr val="002060"/>
+                </a:solidFill>
+              </a:defRPr>
+            </a:lvl2pPr>
+            <a:lvl3pPr algn="ctr">
+              <a:defRPr sz="2400">
+                <a:solidFill>
+                  <a:srgbClr val="002060"/>
+                </a:solidFill>
+              </a:defRPr>
+            </a:lvl3pPr>
+            <a:lvl4pPr algn="ctr">
+              <a:defRPr sz="2133">
+                <a:solidFill>
+                  <a:srgbClr val="002060"/>
+                </a:solidFill>
+              </a:defRPr>
+            </a:lvl4pPr>
+            <a:lvl5pPr algn="ctr">
+              <a:defRPr sz="2133">
+                <a:solidFill>
+                  <a:srgbClr val="002060"/>
+                </a:solidFill>
+              </a:defRPr>
+            </a:lvl5pPr>
+            <a:lvl6pPr>
+              <a:defRPr sz="2133"/>
+            </a:lvl6pPr>
+            <a:lvl7pPr>
+              <a:defRPr sz="2133"/>
+            </a:lvl7pPr>
+            <a:lvl8pPr>
+              <a:defRPr sz="2133"/>
+            </a:lvl8pPr>
+            <a:lvl9pPr>
+              <a:defRPr sz="2133"/>
+            </a:lvl9pPr>
+          </a:lstStyle>
           <a:p>
             <a:pPr lvl="0"/>
             <a:r>
@@ -1784,18 +2461,13 @@
               <a:rPr lang="en-US"/>
               <a:t>Fifth level</a:t>
             </a:r>
-          </a:p>
-        </p:txBody>
-      </p:sp>
-      <p:sp>
-        <p:nvSpPr>
-          <p:cNvPr id="7" name="Date Placeholder 6">
-            <a:extLst>
-              <a:ext uri="{FF2B5EF4-FFF2-40B4-BE49-F238E27FC236}">
-                <a16:creationId xmlns:a16="http://schemas.microsoft.com/office/drawing/2014/main" id="{7411340B-B29E-4605-B518-859A5280037C}"/>
-              </a:ext>
-            </a:extLst>
-          </p:cNvPr>
+            <a:endParaRPr lang="en-US" dirty="0"/>
+          </a:p>
+        </p:txBody>
+      </p:sp>
+      <p:sp>
+        <p:nvSpPr>
+          <p:cNvPr id="7" name="Date Placeholder 6"/>
           <p:cNvSpPr>
             <a:spLocks noGrp="1"/>
           </p:cNvSpPr>
@@ -1818,13 +2490,7 @@
       </p:sp>
       <p:sp>
         <p:nvSpPr>
-          <p:cNvPr id="8" name="Footer Placeholder 7">
-            <a:extLst>
-              <a:ext uri="{FF2B5EF4-FFF2-40B4-BE49-F238E27FC236}">
-                <a16:creationId xmlns:a16="http://schemas.microsoft.com/office/drawing/2014/main" id="{F1D357E3-15AE-4039-AB15-92412BD5EAAC}"/>
-              </a:ext>
-            </a:extLst>
-          </p:cNvPr>
+          <p:cNvPr id="8" name="Footer Placeholder 7"/>
           <p:cNvSpPr>
             <a:spLocks noGrp="1"/>
           </p:cNvSpPr>
@@ -1843,13 +2509,7 @@
       </p:sp>
       <p:sp>
         <p:nvSpPr>
-          <p:cNvPr id="9" name="Slide Number Placeholder 8">
-            <a:extLst>
-              <a:ext uri="{FF2B5EF4-FFF2-40B4-BE49-F238E27FC236}">
-                <a16:creationId xmlns:a16="http://schemas.microsoft.com/office/drawing/2014/main" id="{DDB00C5C-10D8-410E-B51B-E3F96F29F293}"/>
-              </a:ext>
-            </a:extLst>
-          </p:cNvPr>
+          <p:cNvPr id="9" name="Slide Number Placeholder 8"/>
           <p:cNvSpPr>
             <a:spLocks noGrp="1"/>
           </p:cNvSpPr>
@@ -1873,7 +2533,7 @@
     </p:spTree>
     <p:extLst>
       <p:ext uri="{BB962C8B-B14F-4D97-AF65-F5344CB8AC3E}">
-        <p14:creationId xmlns:p14="http://schemas.microsoft.com/office/powerpoint/2010/main" val="3269356228"/>
+        <p14:creationId xmlns:p14="http://schemas.microsoft.com/office/powerpoint/2010/main" val="1888185193"/>
       </p:ext>
     </p:extLst>
   </p:cSld>
@@ -1883,7 +2543,7 @@
 </p:sldLayout>
 </file>
 
-<file path=ppt/slideLayouts/slideLayout6.xml><?xml version="1.0" encoding="utf-8"?>
+<file path=ppt/slideLayouts/slideLayout7.xml><?xml version="1.0" encoding="utf-8"?>
 <p:sldLayout xmlns:a="http://schemas.openxmlformats.org/drawingml/2006/main" xmlns:r="http://schemas.openxmlformats.org/officeDocument/2006/relationships" xmlns:p="http://schemas.openxmlformats.org/presentationml/2006/main" type="titleOnly" preserve="1">
   <p:cSld name="Title Only">
     <p:spTree>
@@ -1902,13 +2562,7 @@
       </p:grpSpPr>
       <p:sp>
         <p:nvSpPr>
-          <p:cNvPr id="2" name="Title 1">
-            <a:extLst>
-              <a:ext uri="{FF2B5EF4-FFF2-40B4-BE49-F238E27FC236}">
-                <a16:creationId xmlns:a16="http://schemas.microsoft.com/office/drawing/2014/main" id="{6C0C1A36-403C-4D2B-978C-D917FCC17D2D}"/>
-              </a:ext>
-            </a:extLst>
-          </p:cNvPr>
+          <p:cNvPr id="2" name="Title 1"/>
           <p:cNvSpPr>
             <a:spLocks noGrp="1"/>
           </p:cNvSpPr>
@@ -1930,13 +2584,7 @@
       </p:sp>
       <p:sp>
         <p:nvSpPr>
-          <p:cNvPr id="3" name="Date Placeholder 2">
-            <a:extLst>
-              <a:ext uri="{FF2B5EF4-FFF2-40B4-BE49-F238E27FC236}">
-                <a16:creationId xmlns:a16="http://schemas.microsoft.com/office/drawing/2014/main" id="{2C8CA73C-BD83-4A9E-B266-AED16C76EE47}"/>
-              </a:ext>
-            </a:extLst>
-          </p:cNvPr>
+          <p:cNvPr id="3" name="Date Placeholder 2"/>
           <p:cNvSpPr>
             <a:spLocks noGrp="1"/>
           </p:cNvSpPr>
@@ -1959,13 +2607,7 @@
       </p:sp>
       <p:sp>
         <p:nvSpPr>
-          <p:cNvPr id="4" name="Footer Placeholder 3">
-            <a:extLst>
-              <a:ext uri="{FF2B5EF4-FFF2-40B4-BE49-F238E27FC236}">
-                <a16:creationId xmlns:a16="http://schemas.microsoft.com/office/drawing/2014/main" id="{01135C75-22E2-45D4-B875-9012E5D7B7E5}"/>
-              </a:ext>
-            </a:extLst>
-          </p:cNvPr>
+          <p:cNvPr id="4" name="Footer Placeholder 3"/>
           <p:cNvSpPr>
             <a:spLocks noGrp="1"/>
           </p:cNvSpPr>
@@ -1984,13 +2626,7 @@
       </p:sp>
       <p:sp>
         <p:nvSpPr>
-          <p:cNvPr id="5" name="Slide Number Placeholder 4">
-            <a:extLst>
-              <a:ext uri="{FF2B5EF4-FFF2-40B4-BE49-F238E27FC236}">
-                <a16:creationId xmlns:a16="http://schemas.microsoft.com/office/drawing/2014/main" id="{2A8CB844-DA6F-4FD9-9981-3DAE3072D2FB}"/>
-              </a:ext>
-            </a:extLst>
-          </p:cNvPr>
+          <p:cNvPr id="5" name="Slide Number Placeholder 4"/>
           <p:cNvSpPr>
             <a:spLocks noGrp="1"/>
           </p:cNvSpPr>
@@ -2014,7 +2650,7 @@
     </p:spTree>
     <p:extLst>
       <p:ext uri="{BB962C8B-B14F-4D97-AF65-F5344CB8AC3E}">
-        <p14:creationId xmlns:p14="http://schemas.microsoft.com/office/powerpoint/2010/main" val="1912233098"/>
+        <p14:creationId xmlns:p14="http://schemas.microsoft.com/office/powerpoint/2010/main" val="964744661"/>
       </p:ext>
     </p:extLst>
   </p:cSld>
@@ -2024,7 +2660,7 @@
 </p:sldLayout>
 </file>
 
-<file path=ppt/slideLayouts/slideLayout7.xml><?xml version="1.0" encoding="utf-8"?>
+<file path=ppt/slideLayouts/slideLayout8.xml><?xml version="1.0" encoding="utf-8"?>
 <p:sldLayout xmlns:a="http://schemas.openxmlformats.org/drawingml/2006/main" xmlns:r="http://schemas.openxmlformats.org/officeDocument/2006/relationships" xmlns:p="http://schemas.openxmlformats.org/presentationml/2006/main" type="blank" preserve="1">
   <p:cSld name="Blank">
     <p:spTree>
@@ -2043,13 +2679,7 @@
       </p:grpSpPr>
       <p:sp>
         <p:nvSpPr>
-          <p:cNvPr id="2" name="Date Placeholder 1">
-            <a:extLst>
-              <a:ext uri="{FF2B5EF4-FFF2-40B4-BE49-F238E27FC236}">
-                <a16:creationId xmlns:a16="http://schemas.microsoft.com/office/drawing/2014/main" id="{DF31EFF5-BEA8-45D1-9031-D4925AC3FB86}"/>
-              </a:ext>
-            </a:extLst>
-          </p:cNvPr>
+          <p:cNvPr id="2" name="Date Placeholder 1"/>
           <p:cNvSpPr>
             <a:spLocks noGrp="1"/>
           </p:cNvSpPr>
@@ -2072,13 +2702,7 @@
       </p:sp>
       <p:sp>
         <p:nvSpPr>
-          <p:cNvPr id="3" name="Footer Placeholder 2">
-            <a:extLst>
-              <a:ext uri="{FF2B5EF4-FFF2-40B4-BE49-F238E27FC236}">
-                <a16:creationId xmlns:a16="http://schemas.microsoft.com/office/drawing/2014/main" id="{7076DF65-C47A-4EE7-8A9D-500AEA794CD8}"/>
-              </a:ext>
-            </a:extLst>
-          </p:cNvPr>
+          <p:cNvPr id="3" name="Footer Placeholder 2"/>
           <p:cNvSpPr>
             <a:spLocks noGrp="1"/>
           </p:cNvSpPr>
@@ -2097,13 +2721,7 @@
       </p:sp>
       <p:sp>
         <p:nvSpPr>
-          <p:cNvPr id="4" name="Slide Number Placeholder 3">
-            <a:extLst>
-              <a:ext uri="{FF2B5EF4-FFF2-40B4-BE49-F238E27FC236}">
-                <a16:creationId xmlns:a16="http://schemas.microsoft.com/office/drawing/2014/main" id="{FBCCB956-A2B3-4848-8EC0-D2FD223468B3}"/>
-              </a:ext>
-            </a:extLst>
-          </p:cNvPr>
+          <p:cNvPr id="4" name="Slide Number Placeholder 3"/>
           <p:cNvSpPr>
             <a:spLocks noGrp="1"/>
           </p:cNvSpPr>
@@ -2127,7 +2745,7 @@
     </p:spTree>
     <p:extLst>
       <p:ext uri="{BB962C8B-B14F-4D97-AF65-F5344CB8AC3E}">
-        <p14:creationId xmlns:p14="http://schemas.microsoft.com/office/powerpoint/2010/main" val="38795409"/>
+        <p14:creationId xmlns:p14="http://schemas.microsoft.com/office/powerpoint/2010/main" val="194318409"/>
       </p:ext>
     </p:extLst>
   </p:cSld>
@@ -2137,7 +2755,7 @@
 </p:sldLayout>
 </file>
 
-<file path=ppt/slideLayouts/slideLayout8.xml><?xml version="1.0" encoding="utf-8"?>
+<file path=ppt/slideLayouts/slideLayout9.xml><?xml version="1.0" encoding="utf-8"?>
 <p:sldLayout xmlns:a="http://schemas.openxmlformats.org/drawingml/2006/main" xmlns:r="http://schemas.openxmlformats.org/officeDocument/2006/relationships" xmlns:p="http://schemas.openxmlformats.org/presentationml/2006/main" type="objTx" preserve="1">
   <p:cSld name="Content with Caption">
     <p:spTree>
@@ -2156,13 +2774,7 @@
       </p:grpSpPr>
       <p:sp>
         <p:nvSpPr>
-          <p:cNvPr id="2" name="Title 1">
-            <a:extLst>
-              <a:ext uri="{FF2B5EF4-FFF2-40B4-BE49-F238E27FC236}">
-                <a16:creationId xmlns:a16="http://schemas.microsoft.com/office/drawing/2014/main" id="{A19FFE2B-0D07-44AF-A730-87FEBEAE4490}"/>
-              </a:ext>
-            </a:extLst>
-          </p:cNvPr>
+          <p:cNvPr id="2" name="Title 1"/>
           <p:cNvSpPr>
             <a:spLocks noGrp="1"/>
           </p:cNvSpPr>
@@ -2172,15 +2784,15 @@
         </p:nvSpPr>
         <p:spPr>
           <a:xfrm>
-            <a:off x="839788" y="457200"/>
-            <a:ext cx="3932237" cy="1600200"/>
+            <a:off x="609602" y="273049"/>
+            <a:ext cx="4011084" cy="1162051"/>
           </a:xfrm>
         </p:spPr>
         <p:txBody>
           <a:bodyPr anchor="b"/>
           <a:lstStyle>
-            <a:lvl1pPr>
-              <a:defRPr sz="3200"/>
+            <a:lvl1pPr algn="l">
+              <a:defRPr sz="2667" b="1"/>
             </a:lvl1pPr>
           </a:lstStyle>
           <a:p>
@@ -2193,13 +2805,7 @@
       </p:sp>
       <p:sp>
         <p:nvSpPr>
-          <p:cNvPr id="3" name="Content Placeholder 2">
-            <a:extLst>
-              <a:ext uri="{FF2B5EF4-FFF2-40B4-BE49-F238E27FC236}">
-                <a16:creationId xmlns:a16="http://schemas.microsoft.com/office/drawing/2014/main" id="{394F260F-F4A8-4DA9-A4E7-B0BB002DDAF6}"/>
-              </a:ext>
-            </a:extLst>
-          </p:cNvPr>
+          <p:cNvPr id="3" name="Content Placeholder 2"/>
           <p:cNvSpPr>
             <a:spLocks noGrp="1"/>
           </p:cNvSpPr>
@@ -2209,39 +2815,39 @@
         </p:nvSpPr>
         <p:spPr>
           <a:xfrm>
-            <a:off x="5183188" y="987425"/>
-            <a:ext cx="6172200" cy="4873625"/>
+            <a:off x="4766733" y="273052"/>
+            <a:ext cx="6815667" cy="5853113"/>
           </a:xfrm>
         </p:spPr>
         <p:txBody>
           <a:bodyPr/>
           <a:lstStyle>
             <a:lvl1pPr>
-              <a:defRPr sz="3200"/>
+              <a:defRPr sz="4267"/>
             </a:lvl1pPr>
             <a:lvl2pPr>
-              <a:defRPr sz="2800"/>
+              <a:defRPr sz="3733"/>
             </a:lvl2pPr>
             <a:lvl3pPr>
-              <a:defRPr sz="2400"/>
+              <a:defRPr sz="3200"/>
             </a:lvl3pPr>
             <a:lvl4pPr>
-              <a:defRPr sz="2000"/>
+              <a:defRPr sz="2667"/>
             </a:lvl4pPr>
             <a:lvl5pPr>
-              <a:defRPr sz="2000"/>
+              <a:defRPr sz="2667"/>
             </a:lvl5pPr>
             <a:lvl6pPr>
-              <a:defRPr sz="2000"/>
+              <a:defRPr sz="2667"/>
             </a:lvl6pPr>
             <a:lvl7pPr>
-              <a:defRPr sz="2000"/>
+              <a:defRPr sz="2667"/>
             </a:lvl7pPr>
             <a:lvl8pPr>
-              <a:defRPr sz="2000"/>
+              <a:defRPr sz="2667"/>
             </a:lvl8pPr>
             <a:lvl9pPr>
-              <a:defRPr sz="2000"/>
+              <a:defRPr sz="2667"/>
             </a:lvl9pPr>
           </a:lstStyle>
           <a:p>
@@ -2283,13 +2889,7 @@
       </p:sp>
       <p:sp>
         <p:nvSpPr>
-          <p:cNvPr id="4" name="Text Placeholder 3">
-            <a:extLst>
-              <a:ext uri="{FF2B5EF4-FFF2-40B4-BE49-F238E27FC236}">
-                <a16:creationId xmlns:a16="http://schemas.microsoft.com/office/drawing/2014/main" id="{8064CC89-D022-493F-8B22-3119E374A156}"/>
-              </a:ext>
-            </a:extLst>
-          </p:cNvPr>
+          <p:cNvPr id="4" name="Text Placeholder 3"/>
           <p:cNvSpPr>
             <a:spLocks noGrp="1"/>
           </p:cNvSpPr>
@@ -2299,8 +2899,8 @@
         </p:nvSpPr>
         <p:spPr>
           <a:xfrm>
-            <a:off x="839788" y="2057400"/>
-            <a:ext cx="3932237" cy="3811588"/>
+            <a:off x="609602" y="1435102"/>
+            <a:ext cx="4011084" cy="4691063"/>
           </a:xfrm>
         </p:spPr>
         <p:txBody>
@@ -2308,39 +2908,39 @@
           <a:lstStyle>
             <a:lvl1pPr marL="0" indent="0">
               <a:buNone/>
+              <a:defRPr sz="1867"/>
+            </a:lvl1pPr>
+            <a:lvl2pPr marL="609585" indent="0">
+              <a:buNone/>
               <a:defRPr sz="1600"/>
-            </a:lvl1pPr>
-            <a:lvl2pPr marL="457200" indent="0">
-              <a:buNone/>
-              <a:defRPr sz="1400"/>
             </a:lvl2pPr>
-            <a:lvl3pPr marL="914400" indent="0">
+            <a:lvl3pPr marL="1219170" indent="0">
+              <a:buNone/>
+              <a:defRPr sz="1333"/>
+            </a:lvl3pPr>
+            <a:lvl4pPr marL="1828754" indent="0">
               <a:buNone/>
               <a:defRPr sz="1200"/>
-            </a:lvl3pPr>
-            <a:lvl4pPr marL="1371600" indent="0">
-              <a:buNone/>
-              <a:defRPr sz="1000"/>
             </a:lvl4pPr>
-            <a:lvl5pPr marL="1828800" indent="0">
-              <a:buNone/>
-              <a:defRPr sz="1000"/>
+            <a:lvl5pPr marL="2438339" indent="0">
+              <a:buNone/>
+              <a:defRPr sz="1200"/>
             </a:lvl5pPr>
-            <a:lvl6pPr marL="2286000" indent="0">
-              <a:buNone/>
-              <a:defRPr sz="1000"/>
+            <a:lvl6pPr marL="3047924" indent="0">
+              <a:buNone/>
+              <a:defRPr sz="1200"/>
             </a:lvl6pPr>
-            <a:lvl7pPr marL="2743200" indent="0">
-              <a:buNone/>
-              <a:defRPr sz="1000"/>
+            <a:lvl7pPr marL="3657509" indent="0">
+              <a:buNone/>
+              <a:defRPr sz="1200"/>
             </a:lvl7pPr>
-            <a:lvl8pPr marL="3200400" indent="0">
-              <a:buNone/>
-              <a:defRPr sz="1000"/>
+            <a:lvl8pPr marL="4267093" indent="0">
+              <a:buNone/>
+              <a:defRPr sz="1200"/>
             </a:lvl8pPr>
-            <a:lvl9pPr marL="3657600" indent="0">
-              <a:buNone/>
-              <a:defRPr sz="1000"/>
+            <a:lvl9pPr marL="4876678" indent="0">
+              <a:buNone/>
+              <a:defRPr sz="1200"/>
             </a:lvl9pPr>
           </a:lstStyle>
           <a:p>
@@ -2354,13 +2954,7 @@
       </p:sp>
       <p:sp>
         <p:nvSpPr>
-          <p:cNvPr id="5" name="Date Placeholder 4">
-            <a:extLst>
-              <a:ext uri="{FF2B5EF4-FFF2-40B4-BE49-F238E27FC236}">
-                <a16:creationId xmlns:a16="http://schemas.microsoft.com/office/drawing/2014/main" id="{098D72A7-CF25-4098-9B40-532FE46988CC}"/>
-              </a:ext>
-            </a:extLst>
-          </p:cNvPr>
+          <p:cNvPr id="5" name="Date Placeholder 4"/>
           <p:cNvSpPr>
             <a:spLocks noGrp="1"/>
           </p:cNvSpPr>
@@ -2383,13 +2977,7 @@
       </p:sp>
       <p:sp>
         <p:nvSpPr>
-          <p:cNvPr id="6" name="Footer Placeholder 5">
-            <a:extLst>
-              <a:ext uri="{FF2B5EF4-FFF2-40B4-BE49-F238E27FC236}">
-                <a16:creationId xmlns:a16="http://schemas.microsoft.com/office/drawing/2014/main" id="{4A73131B-31EE-4026-AF87-6D7A2BD5EA93}"/>
-              </a:ext>
-            </a:extLst>
-          </p:cNvPr>
+          <p:cNvPr id="6" name="Footer Placeholder 5"/>
           <p:cNvSpPr>
             <a:spLocks noGrp="1"/>
           </p:cNvSpPr>
@@ -2408,13 +2996,7 @@
       </p:sp>
       <p:sp>
         <p:nvSpPr>
-          <p:cNvPr id="7" name="Slide Number Placeholder 6">
-            <a:extLst>
-              <a:ext uri="{FF2B5EF4-FFF2-40B4-BE49-F238E27FC236}">
-                <a16:creationId xmlns:a16="http://schemas.microsoft.com/office/drawing/2014/main" id="{FCF7FA40-0BC7-4380-9714-BA2DE5719E5B}"/>
-              </a:ext>
-            </a:extLst>
-          </p:cNvPr>
+          <p:cNvPr id="7" name="Slide Number Placeholder 6"/>
           <p:cNvSpPr>
             <a:spLocks noGrp="1"/>
           </p:cNvSpPr>
@@ -2438,295 +3020,7 @@
     </p:spTree>
     <p:extLst>
       <p:ext uri="{BB962C8B-B14F-4D97-AF65-F5344CB8AC3E}">
-        <p14:creationId xmlns:p14="http://schemas.microsoft.com/office/powerpoint/2010/main" val="2060121239"/>
-      </p:ext>
-    </p:extLst>
-  </p:cSld>
-  <p:clrMapOvr>
-    <a:masterClrMapping/>
-  </p:clrMapOvr>
-</p:sldLayout>
-</file>
-
-<file path=ppt/slideLayouts/slideLayout9.xml><?xml version="1.0" encoding="utf-8"?>
-<p:sldLayout xmlns:a="http://schemas.openxmlformats.org/drawingml/2006/main" xmlns:r="http://schemas.openxmlformats.org/officeDocument/2006/relationships" xmlns:p="http://schemas.openxmlformats.org/presentationml/2006/main" type="picTx" preserve="1">
-  <p:cSld name="Picture with Caption">
-    <p:spTree>
-      <p:nvGrpSpPr>
-        <p:cNvPr id="1" name=""/>
-        <p:cNvGrpSpPr/>
-        <p:nvPr/>
-      </p:nvGrpSpPr>
-      <p:grpSpPr>
-        <a:xfrm>
-          <a:off x="0" y="0"/>
-          <a:ext cx="0" cy="0"/>
-          <a:chOff x="0" y="0"/>
-          <a:chExt cx="0" cy="0"/>
-        </a:xfrm>
-      </p:grpSpPr>
-      <p:sp>
-        <p:nvSpPr>
-          <p:cNvPr id="2" name="Title 1">
-            <a:extLst>
-              <a:ext uri="{FF2B5EF4-FFF2-40B4-BE49-F238E27FC236}">
-                <a16:creationId xmlns:a16="http://schemas.microsoft.com/office/drawing/2014/main" id="{758096E9-B65A-46B2-A26E-3C1D6E86419D}"/>
-              </a:ext>
-            </a:extLst>
-          </p:cNvPr>
-          <p:cNvSpPr>
-            <a:spLocks noGrp="1"/>
-          </p:cNvSpPr>
-          <p:nvPr>
-            <p:ph type="title"/>
-          </p:nvPr>
-        </p:nvSpPr>
-        <p:spPr>
-          <a:xfrm>
-            <a:off x="839788" y="457200"/>
-            <a:ext cx="3932237" cy="1600200"/>
-          </a:xfrm>
-        </p:spPr>
-        <p:txBody>
-          <a:bodyPr anchor="b"/>
-          <a:lstStyle>
-            <a:lvl1pPr>
-              <a:defRPr sz="3200"/>
-            </a:lvl1pPr>
-          </a:lstStyle>
-          <a:p>
-            <a:r>
-              <a:rPr lang="en-US"/>
-              <a:t>Click to edit Master title style</a:t>
-            </a:r>
-          </a:p>
-        </p:txBody>
-      </p:sp>
-      <p:sp>
-        <p:nvSpPr>
-          <p:cNvPr id="3" name="Picture Placeholder 2">
-            <a:extLst>
-              <a:ext uri="{FF2B5EF4-FFF2-40B4-BE49-F238E27FC236}">
-                <a16:creationId xmlns:a16="http://schemas.microsoft.com/office/drawing/2014/main" id="{14118E5F-44CB-4508-A917-8E5894C6A2A4}"/>
-              </a:ext>
-            </a:extLst>
-          </p:cNvPr>
-          <p:cNvSpPr>
-            <a:spLocks noGrp="1"/>
-          </p:cNvSpPr>
-          <p:nvPr>
-            <p:ph type="pic" idx="1"/>
-          </p:nvPr>
-        </p:nvSpPr>
-        <p:spPr>
-          <a:xfrm>
-            <a:off x="5183188" y="987425"/>
-            <a:ext cx="6172200" cy="4873625"/>
-          </a:xfrm>
-        </p:spPr>
-        <p:txBody>
-          <a:bodyPr/>
-          <a:lstStyle>
-            <a:lvl1pPr marL="0" indent="0">
-              <a:buNone/>
-              <a:defRPr sz="3200"/>
-            </a:lvl1pPr>
-            <a:lvl2pPr marL="457200" indent="0">
-              <a:buNone/>
-              <a:defRPr sz="2800"/>
-            </a:lvl2pPr>
-            <a:lvl3pPr marL="914400" indent="0">
-              <a:buNone/>
-              <a:defRPr sz="2400"/>
-            </a:lvl3pPr>
-            <a:lvl4pPr marL="1371600" indent="0">
-              <a:buNone/>
-              <a:defRPr sz="2000"/>
-            </a:lvl4pPr>
-            <a:lvl5pPr marL="1828800" indent="0">
-              <a:buNone/>
-              <a:defRPr sz="2000"/>
-            </a:lvl5pPr>
-            <a:lvl6pPr marL="2286000" indent="0">
-              <a:buNone/>
-              <a:defRPr sz="2000"/>
-            </a:lvl6pPr>
-            <a:lvl7pPr marL="2743200" indent="0">
-              <a:buNone/>
-              <a:defRPr sz="2000"/>
-            </a:lvl7pPr>
-            <a:lvl8pPr marL="3200400" indent="0">
-              <a:buNone/>
-              <a:defRPr sz="2000"/>
-            </a:lvl8pPr>
-            <a:lvl9pPr marL="3657600" indent="0">
-              <a:buNone/>
-              <a:defRPr sz="2000"/>
-            </a:lvl9pPr>
-          </a:lstStyle>
-          <a:p>
-            <a:endParaRPr lang="en-US"/>
-          </a:p>
-        </p:txBody>
-      </p:sp>
-      <p:sp>
-        <p:nvSpPr>
-          <p:cNvPr id="4" name="Text Placeholder 3">
-            <a:extLst>
-              <a:ext uri="{FF2B5EF4-FFF2-40B4-BE49-F238E27FC236}">
-                <a16:creationId xmlns:a16="http://schemas.microsoft.com/office/drawing/2014/main" id="{A74310DC-4DBE-4DCB-B4BD-DBC599A339CA}"/>
-              </a:ext>
-            </a:extLst>
-          </p:cNvPr>
-          <p:cNvSpPr>
-            <a:spLocks noGrp="1"/>
-          </p:cNvSpPr>
-          <p:nvPr>
-            <p:ph type="body" sz="half" idx="2"/>
-          </p:nvPr>
-        </p:nvSpPr>
-        <p:spPr>
-          <a:xfrm>
-            <a:off x="839788" y="2057400"/>
-            <a:ext cx="3932237" cy="3811588"/>
-          </a:xfrm>
-        </p:spPr>
-        <p:txBody>
-          <a:bodyPr/>
-          <a:lstStyle>
-            <a:lvl1pPr marL="0" indent="0">
-              <a:buNone/>
-              <a:defRPr sz="1600"/>
-            </a:lvl1pPr>
-            <a:lvl2pPr marL="457200" indent="0">
-              <a:buNone/>
-              <a:defRPr sz="1400"/>
-            </a:lvl2pPr>
-            <a:lvl3pPr marL="914400" indent="0">
-              <a:buNone/>
-              <a:defRPr sz="1200"/>
-            </a:lvl3pPr>
-            <a:lvl4pPr marL="1371600" indent="0">
-              <a:buNone/>
-              <a:defRPr sz="1000"/>
-            </a:lvl4pPr>
-            <a:lvl5pPr marL="1828800" indent="0">
-              <a:buNone/>
-              <a:defRPr sz="1000"/>
-            </a:lvl5pPr>
-            <a:lvl6pPr marL="2286000" indent="0">
-              <a:buNone/>
-              <a:defRPr sz="1000"/>
-            </a:lvl6pPr>
-            <a:lvl7pPr marL="2743200" indent="0">
-              <a:buNone/>
-              <a:defRPr sz="1000"/>
-            </a:lvl7pPr>
-            <a:lvl8pPr marL="3200400" indent="0">
-              <a:buNone/>
-              <a:defRPr sz="1000"/>
-            </a:lvl8pPr>
-            <a:lvl9pPr marL="3657600" indent="0">
-              <a:buNone/>
-              <a:defRPr sz="1000"/>
-            </a:lvl9pPr>
-          </a:lstStyle>
-          <a:p>
-            <a:pPr lvl="0"/>
-            <a:r>
-              <a:rPr lang="en-US"/>
-              <a:t>Click to edit Master text styles</a:t>
-            </a:r>
-          </a:p>
-        </p:txBody>
-      </p:sp>
-      <p:sp>
-        <p:nvSpPr>
-          <p:cNvPr id="5" name="Date Placeholder 4">
-            <a:extLst>
-              <a:ext uri="{FF2B5EF4-FFF2-40B4-BE49-F238E27FC236}">
-                <a16:creationId xmlns:a16="http://schemas.microsoft.com/office/drawing/2014/main" id="{2798F8CA-C9E7-469F-835B-DF25DB86E871}"/>
-              </a:ext>
-            </a:extLst>
-          </p:cNvPr>
-          <p:cNvSpPr>
-            <a:spLocks noGrp="1"/>
-          </p:cNvSpPr>
-          <p:nvPr>
-            <p:ph type="dt" sz="half" idx="10"/>
-          </p:nvPr>
-        </p:nvSpPr>
-        <p:spPr/>
-        <p:txBody>
-          <a:bodyPr/>
-          <a:lstStyle/>
-          <a:p>
-            <a:fld id="{275923A7-394F-45B3-B9E8-A742D4C55B21}" type="datetimeFigureOut">
-              <a:rPr lang="en-US" smtClean="0"/>
-              <a:t>11/6/2019</a:t>
-            </a:fld>
-            <a:endParaRPr lang="en-US"/>
-          </a:p>
-        </p:txBody>
-      </p:sp>
-      <p:sp>
-        <p:nvSpPr>
-          <p:cNvPr id="6" name="Footer Placeholder 5">
-            <a:extLst>
-              <a:ext uri="{FF2B5EF4-FFF2-40B4-BE49-F238E27FC236}">
-                <a16:creationId xmlns:a16="http://schemas.microsoft.com/office/drawing/2014/main" id="{C1BC0ACC-EFF8-448F-AA7D-CFD888349779}"/>
-              </a:ext>
-            </a:extLst>
-          </p:cNvPr>
-          <p:cNvSpPr>
-            <a:spLocks noGrp="1"/>
-          </p:cNvSpPr>
-          <p:nvPr>
-            <p:ph type="ftr" sz="quarter" idx="11"/>
-          </p:nvPr>
-        </p:nvSpPr>
-        <p:spPr/>
-        <p:txBody>
-          <a:bodyPr/>
-          <a:lstStyle/>
-          <a:p>
-            <a:endParaRPr lang="en-US"/>
-          </a:p>
-        </p:txBody>
-      </p:sp>
-      <p:sp>
-        <p:nvSpPr>
-          <p:cNvPr id="7" name="Slide Number Placeholder 6">
-            <a:extLst>
-              <a:ext uri="{FF2B5EF4-FFF2-40B4-BE49-F238E27FC236}">
-                <a16:creationId xmlns:a16="http://schemas.microsoft.com/office/drawing/2014/main" id="{E88182D1-FEC6-41D5-8DCC-1F207BA7B450}"/>
-              </a:ext>
-            </a:extLst>
-          </p:cNvPr>
-          <p:cNvSpPr>
-            <a:spLocks noGrp="1"/>
-          </p:cNvSpPr>
-          <p:nvPr>
-            <p:ph type="sldNum" sz="quarter" idx="12"/>
-          </p:nvPr>
-        </p:nvSpPr>
-        <p:spPr/>
-        <p:txBody>
-          <a:bodyPr/>
-          <a:lstStyle/>
-          <a:p>
-            <a:fld id="{24E8BC4F-5068-4953-8B8F-C824F90EC491}" type="slidenum">
-              <a:rPr lang="en-US" smtClean="0"/>
-              <a:t>‹#›</a:t>
-            </a:fld>
-            <a:endParaRPr lang="en-US"/>
-          </a:p>
-        </p:txBody>
-      </p:sp>
-    </p:spTree>
-    <p:extLst>
-      <p:ext uri="{BB962C8B-B14F-4D97-AF65-F5344CB8AC3E}">
-        <p14:creationId xmlns:p14="http://schemas.microsoft.com/office/powerpoint/2010/main" val="1123286717"/>
+        <p14:creationId xmlns:p14="http://schemas.microsoft.com/office/powerpoint/2010/main" val="539973927"/>
       </p:ext>
     </p:extLst>
   </p:cSld>
@@ -2740,9 +3034,18 @@
 <p:sldMaster xmlns:a="http://schemas.openxmlformats.org/drawingml/2006/main" xmlns:r="http://schemas.openxmlformats.org/officeDocument/2006/relationships" xmlns:p="http://schemas.openxmlformats.org/presentationml/2006/main">
   <p:cSld>
     <p:bg>
-      <p:bgRef idx="1001">
-        <a:schemeClr val="bg1"/>
-      </p:bgRef>
+      <p:bgPr>
+        <a:blipFill dpi="0" rotWithShape="1">
+          <a:blip r:embed="rId14">
+            <a:lum/>
+          </a:blip>
+          <a:srcRect/>
+          <a:stretch>
+            <a:fillRect/>
+          </a:stretch>
+        </a:blipFill>
+        <a:effectLst/>
+      </p:bgPr>
     </p:bg>
     <p:spTree>
       <p:nvGrpSpPr>
@@ -2760,13 +3063,7 @@
       </p:grpSpPr>
       <p:sp>
         <p:nvSpPr>
-          <p:cNvPr id="2" name="Title Placeholder 1">
-            <a:extLst>
-              <a:ext uri="{FF2B5EF4-FFF2-40B4-BE49-F238E27FC236}">
-                <a16:creationId xmlns:a16="http://schemas.microsoft.com/office/drawing/2014/main" id="{1ED8E7FF-3221-4DB6-AD81-25BFDE3BE44A}"/>
-              </a:ext>
-            </a:extLst>
-          </p:cNvPr>
+          <p:cNvPr id="2" name="Title Placeholder 1"/>
           <p:cNvSpPr>
             <a:spLocks noGrp="1"/>
           </p:cNvSpPr>
@@ -2776,8 +3073,8 @@
         </p:nvSpPr>
         <p:spPr>
           <a:xfrm>
-            <a:off x="838200" y="365125"/>
-            <a:ext cx="10515600" cy="1325563"/>
+            <a:off x="609600" y="274639"/>
+            <a:ext cx="10972800" cy="1143000"/>
           </a:xfrm>
           <a:prstGeom prst="rect">
             <a:avLst/>
@@ -2798,13 +3095,7 @@
       </p:sp>
       <p:sp>
         <p:nvSpPr>
-          <p:cNvPr id="3" name="Text Placeholder 2">
-            <a:extLst>
-              <a:ext uri="{FF2B5EF4-FFF2-40B4-BE49-F238E27FC236}">
-                <a16:creationId xmlns:a16="http://schemas.microsoft.com/office/drawing/2014/main" id="{E05B819A-8D01-4CD9-9506-E4052C418BA3}"/>
-              </a:ext>
-            </a:extLst>
-          </p:cNvPr>
+          <p:cNvPr id="3" name="Text Placeholder 2"/>
           <p:cNvSpPr>
             <a:spLocks noGrp="1"/>
           </p:cNvSpPr>
@@ -2814,8 +3105,8 @@
         </p:nvSpPr>
         <p:spPr>
           <a:xfrm>
-            <a:off x="838200" y="1825625"/>
-            <a:ext cx="10515600" cy="4351338"/>
+            <a:off x="609600" y="1600201"/>
+            <a:ext cx="10972800" cy="4525963"/>
           </a:xfrm>
           <a:prstGeom prst="rect">
             <a:avLst/>
@@ -2865,13 +3156,7 @@
       </p:sp>
       <p:sp>
         <p:nvSpPr>
-          <p:cNvPr id="4" name="Date Placeholder 3">
-            <a:extLst>
-              <a:ext uri="{FF2B5EF4-FFF2-40B4-BE49-F238E27FC236}">
-                <a16:creationId xmlns:a16="http://schemas.microsoft.com/office/drawing/2014/main" id="{CD0EA7C0-89B5-4224-BBC5-265ADD124861}"/>
-              </a:ext>
-            </a:extLst>
-          </p:cNvPr>
+          <p:cNvPr id="4" name="Date Placeholder 3"/>
           <p:cNvSpPr>
             <a:spLocks noGrp="1"/>
           </p:cNvSpPr>
@@ -2881,8 +3166,8 @@
         </p:nvSpPr>
         <p:spPr>
           <a:xfrm>
-            <a:off x="838200" y="6356350"/>
-            <a:ext cx="2743200" cy="365125"/>
+            <a:off x="609600" y="6356351"/>
+            <a:ext cx="2844800" cy="365125"/>
           </a:xfrm>
           <a:prstGeom prst="rect">
             <a:avLst/>
@@ -2892,7 +3177,7 @@
           <a:bodyPr vert="horz" lIns="91440" tIns="45720" rIns="91440" bIns="45720" rtlCol="0" anchor="ctr"/>
           <a:lstStyle>
             <a:lvl1pPr algn="l">
-              <a:defRPr sz="1200">
+              <a:defRPr sz="1600">
                 <a:solidFill>
                   <a:schemeClr val="tx1">
                     <a:tint val="75000"/>
@@ -2912,13 +3197,7 @@
       </p:sp>
       <p:sp>
         <p:nvSpPr>
-          <p:cNvPr id="5" name="Footer Placeholder 4">
-            <a:extLst>
-              <a:ext uri="{FF2B5EF4-FFF2-40B4-BE49-F238E27FC236}">
-                <a16:creationId xmlns:a16="http://schemas.microsoft.com/office/drawing/2014/main" id="{3C5D9767-DD84-489E-BC18-AFFC5C62A512}"/>
-              </a:ext>
-            </a:extLst>
-          </p:cNvPr>
+          <p:cNvPr id="5" name="Footer Placeholder 4"/>
           <p:cNvSpPr>
             <a:spLocks noGrp="1"/>
           </p:cNvSpPr>
@@ -2928,8 +3207,8 @@
         </p:nvSpPr>
         <p:spPr>
           <a:xfrm>
-            <a:off x="4038600" y="6356350"/>
-            <a:ext cx="4114800" cy="365125"/>
+            <a:off x="4165600" y="6356351"/>
+            <a:ext cx="3860800" cy="365125"/>
           </a:xfrm>
           <a:prstGeom prst="rect">
             <a:avLst/>
@@ -2939,7 +3218,7 @@
           <a:bodyPr vert="horz" lIns="91440" tIns="45720" rIns="91440" bIns="45720" rtlCol="0" anchor="ctr"/>
           <a:lstStyle>
             <a:lvl1pPr algn="ctr">
-              <a:defRPr sz="1200">
+              <a:defRPr sz="1600">
                 <a:solidFill>
                   <a:schemeClr val="tx1">
                     <a:tint val="75000"/>
@@ -2955,13 +3234,7 @@
       </p:sp>
       <p:sp>
         <p:nvSpPr>
-          <p:cNvPr id="6" name="Slide Number Placeholder 5">
-            <a:extLst>
-              <a:ext uri="{FF2B5EF4-FFF2-40B4-BE49-F238E27FC236}">
-                <a16:creationId xmlns:a16="http://schemas.microsoft.com/office/drawing/2014/main" id="{0AED0143-8966-473F-9C6A-31753DF5E669}"/>
-              </a:ext>
-            </a:extLst>
-          </p:cNvPr>
+          <p:cNvPr id="6" name="Slide Number Placeholder 5"/>
           <p:cNvSpPr>
             <a:spLocks noGrp="1"/>
           </p:cNvSpPr>
@@ -2971,8 +3244,8 @@
         </p:nvSpPr>
         <p:spPr>
           <a:xfrm>
-            <a:off x="8610600" y="6356350"/>
-            <a:ext cx="2743200" cy="365125"/>
+            <a:off x="8737600" y="6356351"/>
+            <a:ext cx="2844800" cy="365125"/>
           </a:xfrm>
           <a:prstGeom prst="rect">
             <a:avLst/>
@@ -2982,7 +3255,7 @@
           <a:bodyPr vert="horz" lIns="91440" tIns="45720" rIns="91440" bIns="45720" rtlCol="0" anchor="ctr"/>
           <a:lstStyle>
             <a:lvl1pPr algn="r">
-              <a:defRPr sz="1200">
+              <a:defRPr sz="1600">
                 <a:solidFill>
                   <a:schemeClr val="tx1">
                     <a:tint val="75000"/>
@@ -3000,38 +3273,89 @@
           </a:p>
         </p:txBody>
       </p:sp>
+      <p:sp>
+        <p:nvSpPr>
+          <p:cNvPr id="7" name="TextBox 6">
+            <a:extLst>
+              <a:ext uri="{FF2B5EF4-FFF2-40B4-BE49-F238E27FC236}">
+                <a16:creationId xmlns:a16="http://schemas.microsoft.com/office/drawing/2014/main" id="{11E867DF-3DCA-4725-94F0-F2B6BD747A82}"/>
+              </a:ext>
+            </a:extLst>
+          </p:cNvPr>
+          <p:cNvSpPr txBox="1"/>
+          <p:nvPr/>
+        </p:nvSpPr>
+        <p:spPr>
+          <a:xfrm>
+            <a:off x="-12200" y="6951663"/>
+            <a:ext cx="11186167" cy="666977"/>
+          </a:xfrm>
+          <a:prstGeom prst="rect">
+            <a:avLst/>
+          </a:prstGeom>
+          <a:noFill/>
+        </p:spPr>
+        <p:txBody>
+          <a:bodyPr wrap="square" rtlCol="0">
+            <a:spAutoFit/>
+          </a:bodyPr>
+          <a:lstStyle/>
+          <a:p>
+            <a:r>
+              <a:rPr lang="en-US" sz="1867" dirty="0">
+                <a:solidFill>
+                  <a:schemeClr val="bg1">
+                    <a:lumMod val="65000"/>
+                  </a:schemeClr>
+                </a:solidFill>
+              </a:rPr>
+              <a:t>This presentation uses a free template provided by FPPT.com</a:t>
+            </a:r>
+          </a:p>
+          <a:p>
+            <a:r>
+              <a:rPr lang="en-US" sz="1867" dirty="0">
+                <a:solidFill>
+                  <a:schemeClr val="bg1">
+                    <a:lumMod val="65000"/>
+                  </a:schemeClr>
+                </a:solidFill>
+              </a:rPr>
+              <a:t>www.free-power-point-templates.com</a:t>
+            </a:r>
+          </a:p>
+        </p:txBody>
+      </p:sp>
     </p:spTree>
     <p:extLst>
       <p:ext uri="{BB962C8B-B14F-4D97-AF65-F5344CB8AC3E}">
-        <p14:creationId xmlns:p14="http://schemas.microsoft.com/office/powerpoint/2010/main" val="2451945873"/>
+        <p14:creationId xmlns:p14="http://schemas.microsoft.com/office/powerpoint/2010/main" val="3469352255"/>
       </p:ext>
     </p:extLst>
   </p:cSld>
   <p:clrMap bg1="lt1" tx1="dk1" bg2="lt2" tx2="dk2" accent1="accent1" accent2="accent2" accent3="accent3" accent4="accent4" accent5="accent5" accent6="accent6" hlink="hlink" folHlink="folHlink"/>
   <p:sldLayoutIdLst>
-    <p:sldLayoutId id="2147483649" r:id="rId1"/>
-    <p:sldLayoutId id="2147483650" r:id="rId2"/>
-    <p:sldLayoutId id="2147483651" r:id="rId3"/>
-    <p:sldLayoutId id="2147483652" r:id="rId4"/>
-    <p:sldLayoutId id="2147483653" r:id="rId5"/>
-    <p:sldLayoutId id="2147483654" r:id="rId6"/>
-    <p:sldLayoutId id="2147483655" r:id="rId7"/>
-    <p:sldLayoutId id="2147483656" r:id="rId8"/>
-    <p:sldLayoutId id="2147483657" r:id="rId9"/>
-    <p:sldLayoutId id="2147483658" r:id="rId10"/>
-    <p:sldLayoutId id="2147483659" r:id="rId11"/>
+    <p:sldLayoutId id="2147483661" r:id="rId1"/>
+    <p:sldLayoutId id="2147483662" r:id="rId2"/>
+    <p:sldLayoutId id="2147483663" r:id="rId3"/>
+    <p:sldLayoutId id="2147483664" r:id="rId4"/>
+    <p:sldLayoutId id="2147483665" r:id="rId5"/>
+    <p:sldLayoutId id="2147483666" r:id="rId6"/>
+    <p:sldLayoutId id="2147483667" r:id="rId7"/>
+    <p:sldLayoutId id="2147483668" r:id="rId8"/>
+    <p:sldLayoutId id="2147483669" r:id="rId9"/>
+    <p:sldLayoutId id="2147483670" r:id="rId10"/>
+    <p:sldLayoutId id="2147483671" r:id="rId11"/>
+    <p:sldLayoutId id="2147483672" r:id="rId12"/>
   </p:sldLayoutIdLst>
   <p:txStyles>
     <p:titleStyle>
-      <a:lvl1pPr algn="l" defTabSz="914400" rtl="0" eaLnBrk="1" latinLnBrk="0" hangingPunct="1">
-        <a:lnSpc>
-          <a:spcPct val="90000"/>
-        </a:lnSpc>
+      <a:lvl1pPr algn="ctr" defTabSz="1219170" rtl="0" eaLnBrk="1" latinLnBrk="0" hangingPunct="1">
         <a:spcBef>
           <a:spcPct val="0"/>
         </a:spcBef>
         <a:buNone/>
-        <a:defRPr sz="4400" kern="1200">
+        <a:defRPr sz="5867" kern="1200">
           <a:solidFill>
             <a:schemeClr val="tx1"/>
           </a:solidFill>
@@ -3042,16 +3366,13 @@
       </a:lvl1pPr>
     </p:titleStyle>
     <p:bodyStyle>
-      <a:lvl1pPr marL="228600" indent="-228600" algn="l" defTabSz="914400" rtl="0" eaLnBrk="1" latinLnBrk="0" hangingPunct="1">
-        <a:lnSpc>
-          <a:spcPct val="90000"/>
-        </a:lnSpc>
+      <a:lvl1pPr marL="457189" indent="-457189" algn="l" defTabSz="1219170" rtl="0" eaLnBrk="1" latinLnBrk="0" hangingPunct="1">
         <a:spcBef>
-          <a:spcPts val="1000"/>
+          <a:spcPct val="20000"/>
         </a:spcBef>
-        <a:buFont typeface="Arial" panose="020B0604020202020204" pitchFamily="34" charset="0"/>
+        <a:buFont typeface="Arial" pitchFamily="34" charset="0"/>
         <a:buChar char="•"/>
-        <a:defRPr sz="2800" kern="1200">
+        <a:defRPr sz="4267" kern="1200">
           <a:solidFill>
             <a:schemeClr val="tx1"/>
           </a:solidFill>
@@ -3060,16 +3381,13 @@
           <a:cs typeface="+mn-cs"/>
         </a:defRPr>
       </a:lvl1pPr>
-      <a:lvl2pPr marL="685800" indent="-228600" algn="l" defTabSz="914400" rtl="0" eaLnBrk="1" latinLnBrk="0" hangingPunct="1">
-        <a:lnSpc>
-          <a:spcPct val="90000"/>
-        </a:lnSpc>
+      <a:lvl2pPr marL="990575" indent="-380990" algn="l" defTabSz="1219170" rtl="0" eaLnBrk="1" latinLnBrk="0" hangingPunct="1">
         <a:spcBef>
-          <a:spcPts val="500"/>
+          <a:spcPct val="20000"/>
         </a:spcBef>
-        <a:buFont typeface="Arial" panose="020B0604020202020204" pitchFamily="34" charset="0"/>
-        <a:buChar char="•"/>
-        <a:defRPr sz="2400" kern="1200">
+        <a:buFont typeface="Arial" pitchFamily="34" charset="0"/>
+        <a:buChar char="–"/>
+        <a:defRPr sz="3733" kern="1200">
           <a:solidFill>
             <a:schemeClr val="tx1"/>
           </a:solidFill>
@@ -3078,16 +3396,13 @@
           <a:cs typeface="+mn-cs"/>
         </a:defRPr>
       </a:lvl2pPr>
-      <a:lvl3pPr marL="1143000" indent="-228600" algn="l" defTabSz="914400" rtl="0" eaLnBrk="1" latinLnBrk="0" hangingPunct="1">
-        <a:lnSpc>
-          <a:spcPct val="90000"/>
-        </a:lnSpc>
+      <a:lvl3pPr marL="1523962" indent="-304792" algn="l" defTabSz="1219170" rtl="0" eaLnBrk="1" latinLnBrk="0" hangingPunct="1">
         <a:spcBef>
-          <a:spcPts val="500"/>
+          <a:spcPct val="20000"/>
         </a:spcBef>
-        <a:buFont typeface="Arial" panose="020B0604020202020204" pitchFamily="34" charset="0"/>
+        <a:buFont typeface="Arial" pitchFamily="34" charset="0"/>
         <a:buChar char="•"/>
-        <a:defRPr sz="2000" kern="1200">
+        <a:defRPr sz="3200" kern="1200">
           <a:solidFill>
             <a:schemeClr val="tx1"/>
           </a:solidFill>
@@ -3096,16 +3411,13 @@
           <a:cs typeface="+mn-cs"/>
         </a:defRPr>
       </a:lvl3pPr>
-      <a:lvl4pPr marL="1600200" indent="-228600" algn="l" defTabSz="914400" rtl="0" eaLnBrk="1" latinLnBrk="0" hangingPunct="1">
-        <a:lnSpc>
-          <a:spcPct val="90000"/>
-        </a:lnSpc>
+      <a:lvl4pPr marL="2133547" indent="-304792" algn="l" defTabSz="1219170" rtl="0" eaLnBrk="1" latinLnBrk="0" hangingPunct="1">
         <a:spcBef>
-          <a:spcPts val="500"/>
+          <a:spcPct val="20000"/>
         </a:spcBef>
-        <a:buFont typeface="Arial" panose="020B0604020202020204" pitchFamily="34" charset="0"/>
-        <a:buChar char="•"/>
-        <a:defRPr sz="1800" kern="1200">
+        <a:buFont typeface="Arial" pitchFamily="34" charset="0"/>
+        <a:buChar char="–"/>
+        <a:defRPr sz="2667" kern="1200">
           <a:solidFill>
             <a:schemeClr val="tx1"/>
           </a:solidFill>
@@ -3114,16 +3426,13 @@
           <a:cs typeface="+mn-cs"/>
         </a:defRPr>
       </a:lvl4pPr>
-      <a:lvl5pPr marL="2057400" indent="-228600" algn="l" defTabSz="914400" rtl="0" eaLnBrk="1" latinLnBrk="0" hangingPunct="1">
-        <a:lnSpc>
-          <a:spcPct val="90000"/>
-        </a:lnSpc>
+      <a:lvl5pPr marL="2743131" indent="-304792" algn="l" defTabSz="1219170" rtl="0" eaLnBrk="1" latinLnBrk="0" hangingPunct="1">
         <a:spcBef>
-          <a:spcPts val="500"/>
+          <a:spcPct val="20000"/>
         </a:spcBef>
-        <a:buFont typeface="Arial" panose="020B0604020202020204" pitchFamily="34" charset="0"/>
-        <a:buChar char="•"/>
-        <a:defRPr sz="1800" kern="1200">
+        <a:buFont typeface="Arial" pitchFamily="34" charset="0"/>
+        <a:buChar char="»"/>
+        <a:defRPr sz="2667" kern="1200">
           <a:solidFill>
             <a:schemeClr val="tx1"/>
           </a:solidFill>
@@ -3132,16 +3441,13 @@
           <a:cs typeface="+mn-cs"/>
         </a:defRPr>
       </a:lvl5pPr>
-      <a:lvl6pPr marL="2514600" indent="-228600" algn="l" defTabSz="914400" rtl="0" eaLnBrk="1" latinLnBrk="0" hangingPunct="1">
-        <a:lnSpc>
-          <a:spcPct val="90000"/>
-        </a:lnSpc>
+      <a:lvl6pPr marL="3352716" indent="-304792" algn="l" defTabSz="1219170" rtl="0" eaLnBrk="1" latinLnBrk="0" hangingPunct="1">
         <a:spcBef>
-          <a:spcPts val="500"/>
+          <a:spcPct val="20000"/>
         </a:spcBef>
-        <a:buFont typeface="Arial" panose="020B0604020202020204" pitchFamily="34" charset="0"/>
+        <a:buFont typeface="Arial" pitchFamily="34" charset="0"/>
         <a:buChar char="•"/>
-        <a:defRPr sz="1800" kern="1200">
+        <a:defRPr sz="2667" kern="1200">
           <a:solidFill>
             <a:schemeClr val="tx1"/>
           </a:solidFill>
@@ -3150,16 +3456,13 @@
           <a:cs typeface="+mn-cs"/>
         </a:defRPr>
       </a:lvl6pPr>
-      <a:lvl7pPr marL="2971800" indent="-228600" algn="l" defTabSz="914400" rtl="0" eaLnBrk="1" latinLnBrk="0" hangingPunct="1">
-        <a:lnSpc>
-          <a:spcPct val="90000"/>
-        </a:lnSpc>
+      <a:lvl7pPr marL="3962301" indent="-304792" algn="l" defTabSz="1219170" rtl="0" eaLnBrk="1" latinLnBrk="0" hangingPunct="1">
         <a:spcBef>
-          <a:spcPts val="500"/>
+          <a:spcPct val="20000"/>
         </a:spcBef>
-        <a:buFont typeface="Arial" panose="020B0604020202020204" pitchFamily="34" charset="0"/>
+        <a:buFont typeface="Arial" pitchFamily="34" charset="0"/>
         <a:buChar char="•"/>
-        <a:defRPr sz="1800" kern="1200">
+        <a:defRPr sz="2667" kern="1200">
           <a:solidFill>
             <a:schemeClr val="tx1"/>
           </a:solidFill>
@@ -3168,16 +3471,13 @@
           <a:cs typeface="+mn-cs"/>
         </a:defRPr>
       </a:lvl7pPr>
-      <a:lvl8pPr marL="3429000" indent="-228600" algn="l" defTabSz="914400" rtl="0" eaLnBrk="1" latinLnBrk="0" hangingPunct="1">
-        <a:lnSpc>
-          <a:spcPct val="90000"/>
-        </a:lnSpc>
+      <a:lvl8pPr marL="4571886" indent="-304792" algn="l" defTabSz="1219170" rtl="0" eaLnBrk="1" latinLnBrk="0" hangingPunct="1">
         <a:spcBef>
-          <a:spcPts val="500"/>
+          <a:spcPct val="20000"/>
         </a:spcBef>
-        <a:buFont typeface="Arial" panose="020B0604020202020204" pitchFamily="34" charset="0"/>
+        <a:buFont typeface="Arial" pitchFamily="34" charset="0"/>
         <a:buChar char="•"/>
-        <a:defRPr sz="1800" kern="1200">
+        <a:defRPr sz="2667" kern="1200">
           <a:solidFill>
             <a:schemeClr val="tx1"/>
           </a:solidFill>
@@ -3186,16 +3486,13 @@
           <a:cs typeface="+mn-cs"/>
         </a:defRPr>
       </a:lvl8pPr>
-      <a:lvl9pPr marL="3886200" indent="-228600" algn="l" defTabSz="914400" rtl="0" eaLnBrk="1" latinLnBrk="0" hangingPunct="1">
-        <a:lnSpc>
-          <a:spcPct val="90000"/>
-        </a:lnSpc>
+      <a:lvl9pPr marL="5181470" indent="-304792" algn="l" defTabSz="1219170" rtl="0" eaLnBrk="1" latinLnBrk="0" hangingPunct="1">
         <a:spcBef>
-          <a:spcPts val="500"/>
+          <a:spcPct val="20000"/>
         </a:spcBef>
-        <a:buFont typeface="Arial" panose="020B0604020202020204" pitchFamily="34" charset="0"/>
+        <a:buFont typeface="Arial" pitchFamily="34" charset="0"/>
         <a:buChar char="•"/>
-        <a:defRPr sz="1800" kern="1200">
+        <a:defRPr sz="2667" kern="1200">
           <a:solidFill>
             <a:schemeClr val="tx1"/>
           </a:solidFill>
@@ -3209,8 +3506,8 @@
       <a:defPPr>
         <a:defRPr lang="en-US"/>
       </a:defPPr>
-      <a:lvl1pPr marL="0" algn="l" defTabSz="914400" rtl="0" eaLnBrk="1" latinLnBrk="0" hangingPunct="1">
-        <a:defRPr sz="1800" kern="1200">
+      <a:lvl1pPr marL="0" algn="l" defTabSz="1219170" rtl="0" eaLnBrk="1" latinLnBrk="0" hangingPunct="1">
+        <a:defRPr sz="2400" kern="1200">
           <a:solidFill>
             <a:schemeClr val="tx1"/>
           </a:solidFill>
@@ -3219,8 +3516,8 @@
           <a:cs typeface="+mn-cs"/>
         </a:defRPr>
       </a:lvl1pPr>
-      <a:lvl2pPr marL="457200" algn="l" defTabSz="914400" rtl="0" eaLnBrk="1" latinLnBrk="0" hangingPunct="1">
-        <a:defRPr sz="1800" kern="1200">
+      <a:lvl2pPr marL="609585" algn="l" defTabSz="1219170" rtl="0" eaLnBrk="1" latinLnBrk="0" hangingPunct="1">
+        <a:defRPr sz="2400" kern="1200">
           <a:solidFill>
             <a:schemeClr val="tx1"/>
           </a:solidFill>
@@ -3229,8 +3526,8 @@
           <a:cs typeface="+mn-cs"/>
         </a:defRPr>
       </a:lvl2pPr>
-      <a:lvl3pPr marL="914400" algn="l" defTabSz="914400" rtl="0" eaLnBrk="1" latinLnBrk="0" hangingPunct="1">
-        <a:defRPr sz="1800" kern="1200">
+      <a:lvl3pPr marL="1219170" algn="l" defTabSz="1219170" rtl="0" eaLnBrk="1" latinLnBrk="0" hangingPunct="1">
+        <a:defRPr sz="2400" kern="1200">
           <a:solidFill>
             <a:schemeClr val="tx1"/>
           </a:solidFill>
@@ -3239,8 +3536,8 @@
           <a:cs typeface="+mn-cs"/>
         </a:defRPr>
       </a:lvl3pPr>
-      <a:lvl4pPr marL="1371600" algn="l" defTabSz="914400" rtl="0" eaLnBrk="1" latinLnBrk="0" hangingPunct="1">
-        <a:defRPr sz="1800" kern="1200">
+      <a:lvl4pPr marL="1828754" algn="l" defTabSz="1219170" rtl="0" eaLnBrk="1" latinLnBrk="0" hangingPunct="1">
+        <a:defRPr sz="2400" kern="1200">
           <a:solidFill>
             <a:schemeClr val="tx1"/>
           </a:solidFill>
@@ -3249,8 +3546,8 @@
           <a:cs typeface="+mn-cs"/>
         </a:defRPr>
       </a:lvl4pPr>
-      <a:lvl5pPr marL="1828800" algn="l" defTabSz="914400" rtl="0" eaLnBrk="1" latinLnBrk="0" hangingPunct="1">
-        <a:defRPr sz="1800" kern="1200">
+      <a:lvl5pPr marL="2438339" algn="l" defTabSz="1219170" rtl="0" eaLnBrk="1" latinLnBrk="0" hangingPunct="1">
+        <a:defRPr sz="2400" kern="1200">
           <a:solidFill>
             <a:schemeClr val="tx1"/>
           </a:solidFill>
@@ -3259,8 +3556,8 @@
           <a:cs typeface="+mn-cs"/>
         </a:defRPr>
       </a:lvl5pPr>
-      <a:lvl6pPr marL="2286000" algn="l" defTabSz="914400" rtl="0" eaLnBrk="1" latinLnBrk="0" hangingPunct="1">
-        <a:defRPr sz="1800" kern="1200">
+      <a:lvl6pPr marL="3047924" algn="l" defTabSz="1219170" rtl="0" eaLnBrk="1" latinLnBrk="0" hangingPunct="1">
+        <a:defRPr sz="2400" kern="1200">
           <a:solidFill>
             <a:schemeClr val="tx1"/>
           </a:solidFill>
@@ -3269,8 +3566,8 @@
           <a:cs typeface="+mn-cs"/>
         </a:defRPr>
       </a:lvl6pPr>
-      <a:lvl7pPr marL="2743200" algn="l" defTabSz="914400" rtl="0" eaLnBrk="1" latinLnBrk="0" hangingPunct="1">
-        <a:defRPr sz="1800" kern="1200">
+      <a:lvl7pPr marL="3657509" algn="l" defTabSz="1219170" rtl="0" eaLnBrk="1" latinLnBrk="0" hangingPunct="1">
+        <a:defRPr sz="2400" kern="1200">
           <a:solidFill>
             <a:schemeClr val="tx1"/>
           </a:solidFill>
@@ -3279,8 +3576,8 @@
           <a:cs typeface="+mn-cs"/>
         </a:defRPr>
       </a:lvl7pPr>
-      <a:lvl8pPr marL="3200400" algn="l" defTabSz="914400" rtl="0" eaLnBrk="1" latinLnBrk="0" hangingPunct="1">
-        <a:defRPr sz="1800" kern="1200">
+      <a:lvl8pPr marL="4267093" algn="l" defTabSz="1219170" rtl="0" eaLnBrk="1" latinLnBrk="0" hangingPunct="1">
+        <a:defRPr sz="2400" kern="1200">
           <a:solidFill>
             <a:schemeClr val="tx1"/>
           </a:solidFill>
@@ -3289,8 +3586,8 @@
           <a:cs typeface="+mn-cs"/>
         </a:defRPr>
       </a:lvl8pPr>
-      <a:lvl9pPr marL="3657600" algn="l" defTabSz="914400" rtl="0" eaLnBrk="1" latinLnBrk="0" hangingPunct="1">
-        <a:defRPr sz="1800" kern="1200">
+      <a:lvl9pPr marL="4876678" algn="l" defTabSz="1219170" rtl="0" eaLnBrk="1" latinLnBrk="0" hangingPunct="1">
+        <a:defRPr sz="2400" kern="1200">
           <a:solidFill>
             <a:schemeClr val="tx1"/>
           </a:solidFill>
@@ -3344,7 +3641,13 @@
           </a:bodyPr>
           <a:lstStyle/>
           <a:p>
-            <a:endParaRPr lang="en-US" sz="6600" dirty="0"/>
+            <a:r>
+              <a:rPr lang="en-US" sz="6600" dirty="0">
+                <a:latin typeface="Times New Roman" panose="02020603050405020304" pitchFamily="18" charset="0"/>
+                <a:cs typeface="Times New Roman" panose="02020603050405020304" pitchFamily="18" charset="0"/>
+              </a:rPr>
+              <a:t>Pi Xylophone </a:t>
+            </a:r>
           </a:p>
         </p:txBody>
       </p:sp>
@@ -3366,10 +3669,18 @@
         </p:nvSpPr>
         <p:spPr/>
         <p:txBody>
-          <a:bodyPr/>
-          <a:lstStyle/>
-          <a:p>
-            <a:endParaRPr lang="en-US"/>
+          <a:bodyPr>
+            <a:normAutofit/>
+          </a:bodyPr>
+          <a:lstStyle/>
+          <a:p>
+            <a:r>
+              <a:rPr lang="en-US" sz="2400" b="1" dirty="0">
+                <a:latin typeface="Times New Roman" panose="02020603050405020304" pitchFamily="18" charset="0"/>
+                <a:cs typeface="Times New Roman" panose="02020603050405020304" pitchFamily="18" charset="0"/>
+              </a:rPr>
+              <a:t>BY: </a:t>
+            </a:r>
           </a:p>
         </p:txBody>
       </p:sp>
@@ -3386,8 +3697,257 @@
 </p:sld>
 </file>
 
+<file path=ppt/slides/slide2.xml><?xml version="1.0" encoding="utf-8"?>
+<p:sld xmlns:a="http://schemas.openxmlformats.org/drawingml/2006/main" xmlns:r="http://schemas.openxmlformats.org/officeDocument/2006/relationships" xmlns:p="http://schemas.openxmlformats.org/presentationml/2006/main">
+  <p:cSld>
+    <p:spTree>
+      <p:nvGrpSpPr>
+        <p:cNvPr id="1" name=""/>
+        <p:cNvGrpSpPr/>
+        <p:nvPr/>
+      </p:nvGrpSpPr>
+      <p:grpSpPr>
+        <a:xfrm>
+          <a:off x="0" y="0"/>
+          <a:ext cx="0" cy="0"/>
+          <a:chOff x="0" y="0"/>
+          <a:chExt cx="0" cy="0"/>
+        </a:xfrm>
+      </p:grpSpPr>
+      <p:sp>
+        <p:nvSpPr>
+          <p:cNvPr id="2" name="Title 1">
+            <a:extLst>
+              <a:ext uri="{FF2B5EF4-FFF2-40B4-BE49-F238E27FC236}">
+                <a16:creationId xmlns:a16="http://schemas.microsoft.com/office/drawing/2014/main" id="{111B699A-04A7-4901-A191-1D8C7FDB2464}"/>
+              </a:ext>
+            </a:extLst>
+          </p:cNvPr>
+          <p:cNvSpPr>
+            <a:spLocks noGrp="1"/>
+          </p:cNvSpPr>
+          <p:nvPr>
+            <p:ph type="title"/>
+          </p:nvPr>
+        </p:nvSpPr>
+        <p:spPr/>
+        <p:txBody>
+          <a:bodyPr/>
+          <a:lstStyle/>
+          <a:p>
+            <a:r>
+              <a:rPr lang="en-US" dirty="0"/>
+              <a:t>How it works?</a:t>
+            </a:r>
+          </a:p>
+        </p:txBody>
+      </p:sp>
+      <p:sp>
+        <p:nvSpPr>
+          <p:cNvPr id="3" name="Content Placeholder 2">
+            <a:extLst>
+              <a:ext uri="{FF2B5EF4-FFF2-40B4-BE49-F238E27FC236}">
+                <a16:creationId xmlns:a16="http://schemas.microsoft.com/office/drawing/2014/main" id="{3C2EA4A2-4151-463C-AE81-F3A9F90567D6}"/>
+              </a:ext>
+            </a:extLst>
+          </p:cNvPr>
+          <p:cNvSpPr>
+            <a:spLocks noGrp="1"/>
+          </p:cNvSpPr>
+          <p:nvPr>
+            <p:ph idx="1"/>
+          </p:nvPr>
+        </p:nvSpPr>
+        <p:spPr/>
+        <p:txBody>
+          <a:bodyPr/>
+          <a:lstStyle/>
+          <a:p>
+            <a:endParaRPr lang="en-US" dirty="0"/>
+          </a:p>
+        </p:txBody>
+      </p:sp>
+    </p:spTree>
+    <p:extLst>
+      <p:ext uri="{BB962C8B-B14F-4D97-AF65-F5344CB8AC3E}">
+        <p14:creationId xmlns:p14="http://schemas.microsoft.com/office/powerpoint/2010/main" val="2261968061"/>
+      </p:ext>
+    </p:extLst>
+  </p:cSld>
+  <p:clrMapOvr>
+    <a:masterClrMapping/>
+  </p:clrMapOvr>
+</p:sld>
+</file>
+
+<file path=ppt/slides/slide3.xml><?xml version="1.0" encoding="utf-8"?>
+<p:sld xmlns:a="http://schemas.openxmlformats.org/drawingml/2006/main" xmlns:r="http://schemas.openxmlformats.org/officeDocument/2006/relationships" xmlns:p="http://schemas.openxmlformats.org/presentationml/2006/main">
+  <p:cSld>
+    <p:spTree>
+      <p:nvGrpSpPr>
+        <p:cNvPr id="1" name=""/>
+        <p:cNvGrpSpPr/>
+        <p:nvPr/>
+      </p:nvGrpSpPr>
+      <p:grpSpPr>
+        <a:xfrm>
+          <a:off x="0" y="0"/>
+          <a:ext cx="0" cy="0"/>
+          <a:chOff x="0" y="0"/>
+          <a:chExt cx="0" cy="0"/>
+        </a:xfrm>
+      </p:grpSpPr>
+      <p:sp>
+        <p:nvSpPr>
+          <p:cNvPr id="2" name="Title 1">
+            <a:extLst>
+              <a:ext uri="{FF2B5EF4-FFF2-40B4-BE49-F238E27FC236}">
+                <a16:creationId xmlns:a16="http://schemas.microsoft.com/office/drawing/2014/main" id="{FCFA79E6-1431-4B29-9E5F-AC3F78AA2952}"/>
+              </a:ext>
+            </a:extLst>
+          </p:cNvPr>
+          <p:cNvSpPr>
+            <a:spLocks noGrp="1"/>
+          </p:cNvSpPr>
+          <p:nvPr>
+            <p:ph type="title"/>
+          </p:nvPr>
+        </p:nvSpPr>
+        <p:spPr/>
+        <p:txBody>
+          <a:bodyPr/>
+          <a:lstStyle/>
+          <a:p>
+            <a:r>
+              <a:rPr lang="en-US" dirty="0"/>
+              <a:t>Goals</a:t>
+            </a:r>
+          </a:p>
+        </p:txBody>
+      </p:sp>
+      <p:sp>
+        <p:nvSpPr>
+          <p:cNvPr id="3" name="Content Placeholder 2">
+            <a:extLst>
+              <a:ext uri="{FF2B5EF4-FFF2-40B4-BE49-F238E27FC236}">
+                <a16:creationId xmlns:a16="http://schemas.microsoft.com/office/drawing/2014/main" id="{9E1DD9F3-82BF-4D4D-AF73-ABCC88B4D98F}"/>
+              </a:ext>
+            </a:extLst>
+          </p:cNvPr>
+          <p:cNvSpPr>
+            <a:spLocks noGrp="1"/>
+          </p:cNvSpPr>
+          <p:nvPr>
+            <p:ph idx="1"/>
+          </p:nvPr>
+        </p:nvSpPr>
+        <p:spPr/>
+        <p:txBody>
+          <a:bodyPr/>
+          <a:lstStyle/>
+          <a:p>
+            <a:endParaRPr lang="en-US"/>
+          </a:p>
+        </p:txBody>
+      </p:sp>
+    </p:spTree>
+    <p:extLst>
+      <p:ext uri="{BB962C8B-B14F-4D97-AF65-F5344CB8AC3E}">
+        <p14:creationId xmlns:p14="http://schemas.microsoft.com/office/powerpoint/2010/main" val="1743664717"/>
+      </p:ext>
+    </p:extLst>
+  </p:cSld>
+  <p:clrMapOvr>
+    <a:masterClrMapping/>
+  </p:clrMapOvr>
+</p:sld>
+</file>
+
+<file path=ppt/slides/slide4.xml><?xml version="1.0" encoding="utf-8"?>
+<p:sld xmlns:a="http://schemas.openxmlformats.org/drawingml/2006/main" xmlns:r="http://schemas.openxmlformats.org/officeDocument/2006/relationships" xmlns:p="http://schemas.openxmlformats.org/presentationml/2006/main">
+  <p:cSld>
+    <p:spTree>
+      <p:nvGrpSpPr>
+        <p:cNvPr id="1" name=""/>
+        <p:cNvGrpSpPr/>
+        <p:nvPr/>
+      </p:nvGrpSpPr>
+      <p:grpSpPr>
+        <a:xfrm>
+          <a:off x="0" y="0"/>
+          <a:ext cx="0" cy="0"/>
+          <a:chOff x="0" y="0"/>
+          <a:chExt cx="0" cy="0"/>
+        </a:xfrm>
+      </p:grpSpPr>
+      <p:sp>
+        <p:nvSpPr>
+          <p:cNvPr id="2" name="Title 1">
+            <a:extLst>
+              <a:ext uri="{FF2B5EF4-FFF2-40B4-BE49-F238E27FC236}">
+                <a16:creationId xmlns:a16="http://schemas.microsoft.com/office/drawing/2014/main" id="{E61186FC-C4F0-4BFE-A0CC-80239E783EB3}"/>
+              </a:ext>
+            </a:extLst>
+          </p:cNvPr>
+          <p:cNvSpPr>
+            <a:spLocks noGrp="1"/>
+          </p:cNvSpPr>
+          <p:nvPr>
+            <p:ph type="title"/>
+          </p:nvPr>
+        </p:nvSpPr>
+        <p:spPr/>
+        <p:txBody>
+          <a:bodyPr/>
+          <a:lstStyle/>
+          <a:p>
+            <a:r>
+              <a:rPr lang="en-US" dirty="0"/>
+              <a:t>Is it Relevant? </a:t>
+            </a:r>
+          </a:p>
+        </p:txBody>
+      </p:sp>
+      <p:sp>
+        <p:nvSpPr>
+          <p:cNvPr id="3" name="Content Placeholder 2">
+            <a:extLst>
+              <a:ext uri="{FF2B5EF4-FFF2-40B4-BE49-F238E27FC236}">
+                <a16:creationId xmlns:a16="http://schemas.microsoft.com/office/drawing/2014/main" id="{5C4EB008-3555-4B6D-96A7-6B4C5269F92E}"/>
+              </a:ext>
+            </a:extLst>
+          </p:cNvPr>
+          <p:cNvSpPr>
+            <a:spLocks noGrp="1"/>
+          </p:cNvSpPr>
+          <p:nvPr>
+            <p:ph idx="1"/>
+          </p:nvPr>
+        </p:nvSpPr>
+        <p:spPr/>
+        <p:txBody>
+          <a:bodyPr/>
+          <a:lstStyle/>
+          <a:p>
+            <a:endParaRPr lang="en-US" dirty="0"/>
+          </a:p>
+        </p:txBody>
+      </p:sp>
+    </p:spTree>
+    <p:extLst>
+      <p:ext uri="{BB962C8B-B14F-4D97-AF65-F5344CB8AC3E}">
+        <p14:creationId xmlns:p14="http://schemas.microsoft.com/office/powerpoint/2010/main" val="3807087370"/>
+      </p:ext>
+    </p:extLst>
+  </p:cSld>
+  <p:clrMapOvr>
+    <a:masterClrMapping/>
+  </p:clrMapOvr>
+</p:sld>
+</file>
+
 <file path=ppt/theme/theme1.xml><?xml version="1.0" encoding="utf-8"?>
-<a:theme xmlns:a="http://schemas.openxmlformats.org/drawingml/2006/main" name="Office Theme">
+<a:theme xmlns:a="http://schemas.openxmlformats.org/drawingml/2006/main" name="160997-technology-template-16x9">
   <a:themeElements>
     <a:clrScheme name="Office">
       <a:dk1>
@@ -3397,44 +3957,44 @@
         <a:sysClr val="window" lastClr="FFFFFF"/>
       </a:lt1>
       <a:dk2>
-        <a:srgbClr val="44546A"/>
+        <a:srgbClr val="1F497D"/>
       </a:dk2>
       <a:lt2>
-        <a:srgbClr val="E7E6E6"/>
+        <a:srgbClr val="EEECE1"/>
       </a:lt2>
       <a:accent1>
-        <a:srgbClr val="4472C4"/>
+        <a:srgbClr val="4F81BD"/>
       </a:accent1>
       <a:accent2>
-        <a:srgbClr val="ED7D31"/>
+        <a:srgbClr val="C0504D"/>
       </a:accent2>
       <a:accent3>
-        <a:srgbClr val="A5A5A5"/>
+        <a:srgbClr val="9BBB59"/>
       </a:accent3>
       <a:accent4>
-        <a:srgbClr val="FFC000"/>
+        <a:srgbClr val="8064A2"/>
       </a:accent4>
       <a:accent5>
-        <a:srgbClr val="5B9BD5"/>
+        <a:srgbClr val="4BACC6"/>
       </a:accent5>
       <a:accent6>
-        <a:srgbClr val="70AD47"/>
+        <a:srgbClr val="F79646"/>
       </a:accent6>
       <a:hlink>
-        <a:srgbClr val="0563C1"/>
+        <a:srgbClr val="0000FF"/>
       </a:hlink>
       <a:folHlink>
-        <a:srgbClr val="954F72"/>
+        <a:srgbClr val="800080"/>
       </a:folHlink>
     </a:clrScheme>
     <a:fontScheme name="Office">
       <a:majorFont>
-        <a:latin typeface="Calibri Light" panose="020F0302020204030204"/>
+        <a:latin typeface="Calibri"/>
         <a:ea typeface=""/>
         <a:cs typeface=""/>
-        <a:font script="Jpan" typeface="游ゴシック Light"/>
+        <a:font script="Jpan" typeface="ＭＳ Ｐゴシック"/>
         <a:font script="Hang" typeface="맑은 고딕"/>
-        <a:font script="Hans" typeface="等线 Light"/>
+        <a:font script="Hans" typeface="宋体"/>
         <a:font script="Hant" typeface="新細明體"/>
         <a:font script="Arab" typeface="Times New Roman"/>
         <a:font script="Hebr" typeface="Times New Roman"/>
@@ -3462,31 +4022,14 @@
         <a:font script="Viet" typeface="Times New Roman"/>
         <a:font script="Uigh" typeface="Microsoft Uighur"/>
         <a:font script="Geor" typeface="Sylfaen"/>
-        <a:font script="Armn" typeface="Arial"/>
-        <a:font script="Bugi" typeface="Leelawadee UI"/>
-        <a:font script="Bopo" typeface="Microsoft JhengHei"/>
-        <a:font script="Java" typeface="Javanese Text"/>
-        <a:font script="Lisu" typeface="Segoe UI"/>
-        <a:font script="Mymr" typeface="Myanmar Text"/>
-        <a:font script="Nkoo" typeface="Ebrima"/>
-        <a:font script="Olck" typeface="Nirmala UI"/>
-        <a:font script="Osma" typeface="Ebrima"/>
-        <a:font script="Phag" typeface="Phagspa"/>
-        <a:font script="Syrn" typeface="Estrangelo Edessa"/>
-        <a:font script="Syrj" typeface="Estrangelo Edessa"/>
-        <a:font script="Syre" typeface="Estrangelo Edessa"/>
-        <a:font script="Sora" typeface="Nirmala UI"/>
-        <a:font script="Tale" typeface="Microsoft Tai Le"/>
-        <a:font script="Talu" typeface="Microsoft New Tai Lue"/>
-        <a:font script="Tfng" typeface="Ebrima"/>
       </a:majorFont>
       <a:minorFont>
-        <a:latin typeface="Calibri" panose="020F0502020204030204"/>
+        <a:latin typeface="Calibri"/>
         <a:ea typeface=""/>
         <a:cs typeface=""/>
-        <a:font script="Jpan" typeface="游ゴシック"/>
+        <a:font script="Jpan" typeface="ＭＳ Ｐゴシック"/>
         <a:font script="Hang" typeface="맑은 고딕"/>
-        <a:font script="Hans" typeface="等线"/>
+        <a:font script="Hans" typeface="宋体"/>
         <a:font script="Hant" typeface="新細明體"/>
         <a:font script="Arab" typeface="Arial"/>
         <a:font script="Hebr" typeface="Arial"/>
@@ -3514,23 +4057,6 @@
         <a:font script="Viet" typeface="Arial"/>
         <a:font script="Uigh" typeface="Microsoft Uighur"/>
         <a:font script="Geor" typeface="Sylfaen"/>
-        <a:font script="Armn" typeface="Arial"/>
-        <a:font script="Bugi" typeface="Leelawadee UI"/>
-        <a:font script="Bopo" typeface="Microsoft JhengHei"/>
-        <a:font script="Java" typeface="Javanese Text"/>
-        <a:font script="Lisu" typeface="Segoe UI"/>
-        <a:font script="Mymr" typeface="Myanmar Text"/>
-        <a:font script="Nkoo" typeface="Ebrima"/>
-        <a:font script="Olck" typeface="Nirmala UI"/>
-        <a:font script="Osma" typeface="Ebrima"/>
-        <a:font script="Phag" typeface="Phagspa"/>
-        <a:font script="Syrn" typeface="Estrangelo Edessa"/>
-        <a:font script="Syrj" typeface="Estrangelo Edessa"/>
-        <a:font script="Syre" typeface="Estrangelo Edessa"/>
-        <a:font script="Sora" typeface="Nirmala UI"/>
-        <a:font script="Tale" typeface="Microsoft Tai Le"/>
-        <a:font script="Talu" typeface="Microsoft New Tai Lue"/>
-        <a:font script="Tfng" typeface="Ebrima"/>
       </a:minorFont>
     </a:fontScheme>
     <a:fmtScheme name="Office">
@@ -3542,141 +4068,165 @@
           <a:gsLst>
             <a:gs pos="0">
               <a:schemeClr val="phClr">
-                <a:lumMod val="110000"/>
-                <a:satMod val="105000"/>
-                <a:tint val="67000"/>
+                <a:tint val="50000"/>
+                <a:satMod val="300000"/>
               </a:schemeClr>
             </a:gs>
-            <a:gs pos="50000">
+            <a:gs pos="35000">
               <a:schemeClr val="phClr">
-                <a:lumMod val="105000"/>
-                <a:satMod val="103000"/>
-                <a:tint val="73000"/>
+                <a:tint val="37000"/>
+                <a:satMod val="300000"/>
               </a:schemeClr>
             </a:gs>
             <a:gs pos="100000">
               <a:schemeClr val="phClr">
-                <a:lumMod val="105000"/>
-                <a:satMod val="109000"/>
-                <a:tint val="81000"/>
+                <a:tint val="15000"/>
+                <a:satMod val="350000"/>
               </a:schemeClr>
             </a:gs>
           </a:gsLst>
-          <a:lin ang="5400000" scaled="0"/>
+          <a:lin ang="16200000" scaled="1"/>
         </a:gradFill>
         <a:gradFill rotWithShape="1">
           <a:gsLst>
             <a:gs pos="0">
               <a:schemeClr val="phClr">
-                <a:satMod val="103000"/>
-                <a:lumMod val="102000"/>
-                <a:tint val="94000"/>
+                <a:shade val="51000"/>
+                <a:satMod val="130000"/>
               </a:schemeClr>
             </a:gs>
-            <a:gs pos="50000">
+            <a:gs pos="80000">
               <a:schemeClr val="phClr">
-                <a:satMod val="110000"/>
-                <a:lumMod val="100000"/>
-                <a:shade val="100000"/>
+                <a:shade val="93000"/>
+                <a:satMod val="130000"/>
               </a:schemeClr>
             </a:gs>
             <a:gs pos="100000">
               <a:schemeClr val="phClr">
-                <a:lumMod val="99000"/>
-                <a:satMod val="120000"/>
-                <a:shade val="78000"/>
+                <a:shade val="94000"/>
+                <a:satMod val="135000"/>
               </a:schemeClr>
             </a:gs>
           </a:gsLst>
-          <a:lin ang="5400000" scaled="0"/>
+          <a:lin ang="16200000" scaled="0"/>
         </a:gradFill>
       </a:fillStyleLst>
       <a:lnStyleLst>
-        <a:ln w="6350" cap="flat" cmpd="sng" algn="ctr">
+        <a:ln w="9525" cap="flat" cmpd="sng" algn="ctr">
+          <a:solidFill>
+            <a:schemeClr val="phClr">
+              <a:shade val="95000"/>
+              <a:satMod val="105000"/>
+            </a:schemeClr>
+          </a:solidFill>
+          <a:prstDash val="solid"/>
+        </a:ln>
+        <a:ln w="25400" cap="flat" cmpd="sng" algn="ctr">
           <a:solidFill>
             <a:schemeClr val="phClr"/>
           </a:solidFill>
           <a:prstDash val="solid"/>
-          <a:miter lim="800000"/>
         </a:ln>
-        <a:ln w="12700" cap="flat" cmpd="sng" algn="ctr">
+        <a:ln w="38100" cap="flat" cmpd="sng" algn="ctr">
           <a:solidFill>
             <a:schemeClr val="phClr"/>
           </a:solidFill>
           <a:prstDash val="solid"/>
-          <a:miter lim="800000"/>
-        </a:ln>
-        <a:ln w="19050" cap="flat" cmpd="sng" algn="ctr">
-          <a:solidFill>
-            <a:schemeClr val="phClr"/>
-          </a:solidFill>
-          <a:prstDash val="solid"/>
-          <a:miter lim="800000"/>
         </a:ln>
       </a:lnStyleLst>
       <a:effectStyleLst>
         <a:effectStyle>
-          <a:effectLst/>
-        </a:effectStyle>
-        <a:effectStyle>
-          <a:effectLst/>
+          <a:effectLst>
+            <a:outerShdw blurRad="40000" dist="20000" dir="5400000" rotWithShape="0">
+              <a:srgbClr val="000000">
+                <a:alpha val="38000"/>
+              </a:srgbClr>
+            </a:outerShdw>
+          </a:effectLst>
         </a:effectStyle>
         <a:effectStyle>
           <a:effectLst>
-            <a:outerShdw blurRad="57150" dist="19050" dir="5400000" algn="ctr" rotWithShape="0">
+            <a:outerShdw blurRad="40000" dist="23000" dir="5400000" rotWithShape="0">
               <a:srgbClr val="000000">
-                <a:alpha val="63000"/>
+                <a:alpha val="35000"/>
               </a:srgbClr>
             </a:outerShdw>
           </a:effectLst>
+        </a:effectStyle>
+        <a:effectStyle>
+          <a:effectLst>
+            <a:outerShdw blurRad="40000" dist="23000" dir="5400000" rotWithShape="0">
+              <a:srgbClr val="000000">
+                <a:alpha val="35000"/>
+              </a:srgbClr>
+            </a:outerShdw>
+          </a:effectLst>
+          <a:scene3d>
+            <a:camera prst="orthographicFront">
+              <a:rot lat="0" lon="0" rev="0"/>
+            </a:camera>
+            <a:lightRig rig="threePt" dir="t">
+              <a:rot lat="0" lon="0" rev="1200000"/>
+            </a:lightRig>
+          </a:scene3d>
+          <a:sp3d>
+            <a:bevelT w="63500" h="25400"/>
+          </a:sp3d>
         </a:effectStyle>
       </a:effectStyleLst>
       <a:bgFillStyleLst>
         <a:solidFill>
           <a:schemeClr val="phClr"/>
         </a:solidFill>
-        <a:solidFill>
-          <a:schemeClr val="phClr">
-            <a:tint val="95000"/>
-            <a:satMod val="170000"/>
-          </a:schemeClr>
-        </a:solidFill>
         <a:gradFill rotWithShape="1">
           <a:gsLst>
             <a:gs pos="0">
               <a:schemeClr val="phClr">
-                <a:tint val="93000"/>
-                <a:satMod val="150000"/>
-                <a:shade val="98000"/>
-                <a:lumMod val="102000"/>
+                <a:tint val="40000"/>
+                <a:satMod val="350000"/>
               </a:schemeClr>
             </a:gs>
-            <a:gs pos="50000">
+            <a:gs pos="40000">
               <a:schemeClr val="phClr">
-                <a:tint val="98000"/>
-                <a:satMod val="130000"/>
-                <a:shade val="90000"/>
-                <a:lumMod val="103000"/>
+                <a:tint val="45000"/>
+                <a:shade val="99000"/>
+                <a:satMod val="350000"/>
               </a:schemeClr>
             </a:gs>
             <a:gs pos="100000">
               <a:schemeClr val="phClr">
-                <a:shade val="63000"/>
-                <a:satMod val="120000"/>
+                <a:shade val="20000"/>
+                <a:satMod val="255000"/>
               </a:schemeClr>
             </a:gs>
           </a:gsLst>
-          <a:lin ang="5400000" scaled="0"/>
+          <a:path path="circle">
+            <a:fillToRect l="50000" t="-80000" r="50000" b="180000"/>
+          </a:path>
+        </a:gradFill>
+        <a:gradFill rotWithShape="1">
+          <a:gsLst>
+            <a:gs pos="0">
+              <a:schemeClr val="phClr">
+                <a:tint val="80000"/>
+                <a:satMod val="300000"/>
+              </a:schemeClr>
+            </a:gs>
+            <a:gs pos="100000">
+              <a:schemeClr val="phClr">
+                <a:shade val="30000"/>
+                <a:satMod val="200000"/>
+              </a:schemeClr>
+            </a:gs>
+          </a:gsLst>
+          <a:path path="circle">
+            <a:fillToRect l="50000" t="50000" r="50000" b="50000"/>
+          </a:path>
         </a:gradFill>
       </a:bgFillStyleLst>
     </a:fmtScheme>
   </a:themeElements>
   <a:objectDefaults/>
   <a:extraClrSchemeLst/>
-  <a:extLst>
-    <a:ext uri="{05A4C25C-085E-4340-85A3-A5531E510DB2}">
-      <thm15:themeFamily xmlns:thm15="http://schemas.microsoft.com/office/thememl/2012/main" name="Office Theme" id="{62F939B6-93AF-4DB8-9C6B-D6C7DFDC589F}" vid="{4A3C46E8-61CC-4603-A589-7422A47A8E4A}"/>
-    </a:ext>
-  </a:extLst>
 </a:theme>
 </file>
</xml_diff>